<commit_message>
update prasentation + userguide
</commit_message>
<xml_diff>
--- a/Documentation/ProjectDocumentation/Presentation.pptx
+++ b/Documentation/ProjectDocumentation/Presentation.pptx
@@ -4,6 +4,19 @@
   <p:sldMasterIdLst>
     <p:sldMasterId id="2147483648" r:id="rId1"/>
   </p:sldMasterIdLst>
+  <p:sldIdLst>
+    <p:sldId id="256" r:id="rId2"/>
+    <p:sldId id="257" r:id="rId3"/>
+    <p:sldId id="258" r:id="rId4"/>
+    <p:sldId id="259" r:id="rId5"/>
+    <p:sldId id="260" r:id="rId6"/>
+    <p:sldId id="261" r:id="rId7"/>
+    <p:sldId id="262" r:id="rId8"/>
+    <p:sldId id="263" r:id="rId9"/>
+    <p:sldId id="264" r:id="rId10"/>
+    <p:sldId id="265" r:id="rId11"/>
+    <p:sldId id="266" r:id="rId12"/>
+  </p:sldIdLst>
   <p:sldSz cx="9144000" cy="6858000" type="screen4x3"/>
   <p:notesSz cx="6858000" cy="9144000"/>
   <p:defaultTextStyle>
@@ -101,7 +114,27 @@
       </a:defRPr>
     </a:lvl9pPr>
   </p:defaultTextStyle>
+  <p:extLst>
+    <p:ext uri="{EFAFB233-063F-42B5-8137-9DF3F51BA10A}">
+      <p15:sldGuideLst xmlns:p15="http://schemas.microsoft.com/office/powerpoint/2012/main">
+        <p15:guide id="1" orient="horz" pos="2160">
+          <p15:clr>
+            <a:srgbClr val="A4A3A4"/>
+          </p15:clr>
+        </p15:guide>
+        <p15:guide id="2" pos="2880">
+          <p15:clr>
+            <a:srgbClr val="A4A3A4"/>
+          </p15:clr>
+        </p15:guide>
+      </p15:sldGuideLst>
+    </p:ext>
+  </p:extLst>
 </p:presentation>
+</file>
+
+<file path=ppt/revisionInfo.xml><?xml version="1.0" encoding="utf-8"?>
+<p1510:revInfo xmlns:a="http://schemas.openxmlformats.org/drawingml/2006/main" xmlns:r="http://schemas.openxmlformats.org/officeDocument/2006/relationships" xmlns:p1510="http://schemas.microsoft.com/office/powerpoint/2015/10/main"/>
 </file>
 
 <file path=ppt/slideLayouts/slideLayout1.xml><?xml version="1.0" encoding="utf-8"?>
@@ -142,10 +175,9 @@
           <a:lstStyle/>
           <a:p>
             <a:r>
-              <a:rPr lang="de-DE" smtClean="0"/>
+              <a:rPr lang="de-DE"/>
               <a:t>Titelmasterformat durch Klicken bearbeiten</a:t>
             </a:r>
-            <a:endParaRPr lang="de-DE"/>
           </a:p>
         </p:txBody>
       </p:sp>
@@ -261,10 +293,9 @@
           </a:lstStyle>
           <a:p>
             <a:r>
-              <a:rPr lang="de-DE" smtClean="0"/>
+              <a:rPr lang="de-DE"/>
               <a:t>Formatvorlage des Untertitelmasters durch Klicken bearbeiten</a:t>
             </a:r>
-            <a:endParaRPr lang="de-DE"/>
           </a:p>
         </p:txBody>
       </p:sp>
@@ -285,7 +316,7 @@
           <a:p>
             <a:fld id="{1BA50D42-C9CD-4801-B293-61D1F53EC57E}" type="datetimeFigureOut">
               <a:rPr lang="de-DE" smtClean="0"/>
-              <a:t>14.09.2006</a:t>
+              <a:t>27.06.2017</a:t>
             </a:fld>
             <a:endParaRPr lang="de-DE"/>
           </a:p>
@@ -374,10 +405,9 @@
           <a:lstStyle/>
           <a:p>
             <a:r>
-              <a:rPr lang="de-DE" smtClean="0"/>
+              <a:rPr lang="de-DE"/>
               <a:t>Titelmasterformat durch Klicken bearbeiten</a:t>
             </a:r>
-            <a:endParaRPr lang="de-DE"/>
           </a:p>
         </p:txBody>
       </p:sp>
@@ -398,38 +428,37 @@
           <a:p>
             <a:pPr lvl="0"/>
             <a:r>
-              <a:rPr lang="de-DE" smtClean="0"/>
+              <a:rPr lang="de-DE"/>
               <a:t>Textmasterformate durch Klicken bearbeiten</a:t>
             </a:r>
           </a:p>
           <a:p>
             <a:pPr lvl="1"/>
             <a:r>
-              <a:rPr lang="de-DE" smtClean="0"/>
+              <a:rPr lang="de-DE"/>
               <a:t>Zweite Ebene</a:t>
             </a:r>
           </a:p>
           <a:p>
             <a:pPr lvl="2"/>
             <a:r>
-              <a:rPr lang="de-DE" smtClean="0"/>
+              <a:rPr lang="de-DE"/>
               <a:t>Dritte Ebene</a:t>
             </a:r>
           </a:p>
           <a:p>
             <a:pPr lvl="3"/>
             <a:r>
-              <a:rPr lang="de-DE" smtClean="0"/>
+              <a:rPr lang="de-DE"/>
               <a:t>Vierte Ebene</a:t>
             </a:r>
           </a:p>
           <a:p>
             <a:pPr lvl="4"/>
             <a:r>
-              <a:rPr lang="de-DE" smtClean="0"/>
+              <a:rPr lang="de-DE"/>
               <a:t>Fünfte Ebene</a:t>
             </a:r>
-            <a:endParaRPr lang="de-DE"/>
           </a:p>
         </p:txBody>
       </p:sp>
@@ -450,7 +479,7 @@
           <a:p>
             <a:fld id="{1BA50D42-C9CD-4801-B293-61D1F53EC57E}" type="datetimeFigureOut">
               <a:rPr lang="de-DE" smtClean="0"/>
-              <a:t>14.09.2006</a:t>
+              <a:t>27.06.2017</a:t>
             </a:fld>
             <a:endParaRPr lang="de-DE"/>
           </a:p>
@@ -544,10 +573,9 @@
           <a:lstStyle/>
           <a:p>
             <a:r>
-              <a:rPr lang="de-DE" smtClean="0"/>
+              <a:rPr lang="de-DE"/>
               <a:t>Titel durch Klicken hinzufügen</a:t>
             </a:r>
-            <a:endParaRPr lang="de-DE"/>
           </a:p>
         </p:txBody>
       </p:sp>
@@ -573,38 +601,37 @@
           <a:p>
             <a:pPr lvl="0"/>
             <a:r>
-              <a:rPr lang="de-DE" smtClean="0"/>
+              <a:rPr lang="de-DE"/>
               <a:t>Textmasterformate durch Klicken bearbeiten</a:t>
             </a:r>
           </a:p>
           <a:p>
             <a:pPr lvl="1"/>
             <a:r>
-              <a:rPr lang="de-DE" smtClean="0"/>
+              <a:rPr lang="de-DE"/>
               <a:t>Zweite Ebene</a:t>
             </a:r>
           </a:p>
           <a:p>
             <a:pPr lvl="2"/>
             <a:r>
-              <a:rPr lang="de-DE" smtClean="0"/>
+              <a:rPr lang="de-DE"/>
               <a:t>Dritte Ebene</a:t>
             </a:r>
           </a:p>
           <a:p>
             <a:pPr lvl="3"/>
             <a:r>
-              <a:rPr lang="de-DE" smtClean="0"/>
+              <a:rPr lang="de-DE"/>
               <a:t>Vierte Ebene</a:t>
             </a:r>
           </a:p>
           <a:p>
             <a:pPr lvl="4"/>
             <a:r>
-              <a:rPr lang="de-DE" smtClean="0"/>
+              <a:rPr lang="de-DE"/>
               <a:t>Fünfte Ebene</a:t>
             </a:r>
-            <a:endParaRPr lang="de-DE"/>
           </a:p>
         </p:txBody>
       </p:sp>
@@ -625,7 +652,7 @@
           <a:p>
             <a:fld id="{1BA50D42-C9CD-4801-B293-61D1F53EC57E}" type="datetimeFigureOut">
               <a:rPr lang="de-DE" smtClean="0"/>
-              <a:t>14.09.2006</a:t>
+              <a:t>27.06.2017</a:t>
             </a:fld>
             <a:endParaRPr lang="de-DE"/>
           </a:p>
@@ -714,10 +741,9 @@
           <a:lstStyle/>
           <a:p>
             <a:r>
-              <a:rPr lang="de-DE" smtClean="0"/>
+              <a:rPr lang="de-DE"/>
               <a:t>Titelmasterformat durch Klicken bearbeiten</a:t>
             </a:r>
-            <a:endParaRPr lang="de-DE"/>
           </a:p>
         </p:txBody>
       </p:sp>
@@ -738,38 +764,37 @@
           <a:p>
             <a:pPr lvl="0"/>
             <a:r>
-              <a:rPr lang="de-DE" smtClean="0"/>
+              <a:rPr lang="de-DE"/>
               <a:t>Textmasterformate durch Klicken bearbeiten</a:t>
             </a:r>
           </a:p>
           <a:p>
             <a:pPr lvl="1"/>
             <a:r>
-              <a:rPr lang="de-DE" smtClean="0"/>
+              <a:rPr lang="de-DE"/>
               <a:t>Zweite Ebene</a:t>
             </a:r>
           </a:p>
           <a:p>
             <a:pPr lvl="2"/>
             <a:r>
-              <a:rPr lang="de-DE" smtClean="0"/>
+              <a:rPr lang="de-DE"/>
               <a:t>Dritte Ebene</a:t>
             </a:r>
           </a:p>
           <a:p>
             <a:pPr lvl="3"/>
             <a:r>
-              <a:rPr lang="de-DE" smtClean="0"/>
+              <a:rPr lang="de-DE"/>
               <a:t>Vierte Ebene</a:t>
             </a:r>
           </a:p>
           <a:p>
             <a:pPr lvl="4"/>
             <a:r>
-              <a:rPr lang="de-DE" smtClean="0"/>
+              <a:rPr lang="de-DE"/>
               <a:t>Fünfte Ebene</a:t>
             </a:r>
-            <a:endParaRPr lang="de-DE"/>
           </a:p>
         </p:txBody>
       </p:sp>
@@ -790,7 +815,7 @@
           <a:p>
             <a:fld id="{1BA50D42-C9CD-4801-B293-61D1F53EC57E}" type="datetimeFigureOut">
               <a:rPr lang="de-DE" smtClean="0"/>
-              <a:t>14.09.2006</a:t>
+              <a:t>27.06.2017</a:t>
             </a:fld>
             <a:endParaRPr lang="de-DE"/>
           </a:p>
@@ -888,10 +913,9 @@
           </a:lstStyle>
           <a:p>
             <a:r>
-              <a:rPr lang="de-DE" smtClean="0"/>
+              <a:rPr lang="de-DE"/>
               <a:t>Titelmasterformat durch Klicken bearbeiten</a:t>
             </a:r>
-            <a:endParaRPr lang="de-DE"/>
           </a:p>
         </p:txBody>
       </p:sp>
@@ -1008,7 +1032,7 @@
           <a:p>
             <a:pPr lvl="0"/>
             <a:r>
-              <a:rPr lang="de-DE" smtClean="0"/>
+              <a:rPr lang="de-DE"/>
               <a:t>Textmasterformate durch Klicken bearbeiten</a:t>
             </a:r>
           </a:p>
@@ -1031,7 +1055,7 @@
           <a:p>
             <a:fld id="{1BA50D42-C9CD-4801-B293-61D1F53EC57E}" type="datetimeFigureOut">
               <a:rPr lang="de-DE" smtClean="0"/>
-              <a:t>14.09.2006</a:t>
+              <a:t>27.06.2017</a:t>
             </a:fld>
             <a:endParaRPr lang="de-DE"/>
           </a:p>
@@ -1120,10 +1144,9 @@
           <a:lstStyle/>
           <a:p>
             <a:r>
-              <a:rPr lang="de-DE" smtClean="0"/>
+              <a:rPr lang="de-DE"/>
               <a:t>Titelmasterformat durch Klicken bearbeiten</a:t>
             </a:r>
-            <a:endParaRPr lang="de-DE"/>
           </a:p>
         </p:txBody>
       </p:sp>
@@ -1177,38 +1200,37 @@
           <a:p>
             <a:pPr lvl="0"/>
             <a:r>
-              <a:rPr lang="de-DE" smtClean="0"/>
+              <a:rPr lang="de-DE"/>
               <a:t>Textmasterformate durch Klicken bearbeiten</a:t>
             </a:r>
           </a:p>
           <a:p>
             <a:pPr lvl="1"/>
             <a:r>
-              <a:rPr lang="de-DE" smtClean="0"/>
+              <a:rPr lang="de-DE"/>
               <a:t>Zweite Ebene</a:t>
             </a:r>
           </a:p>
           <a:p>
             <a:pPr lvl="2"/>
             <a:r>
-              <a:rPr lang="de-DE" smtClean="0"/>
+              <a:rPr lang="de-DE"/>
               <a:t>Dritte Ebene</a:t>
             </a:r>
           </a:p>
           <a:p>
             <a:pPr lvl="3"/>
             <a:r>
-              <a:rPr lang="de-DE" smtClean="0"/>
+              <a:rPr lang="de-DE"/>
               <a:t>Vierte Ebene</a:t>
             </a:r>
           </a:p>
           <a:p>
             <a:pPr lvl="4"/>
             <a:r>
-              <a:rPr lang="de-DE" smtClean="0"/>
+              <a:rPr lang="de-DE"/>
               <a:t>Fünfte Ebene</a:t>
             </a:r>
-            <a:endParaRPr lang="de-DE"/>
           </a:p>
         </p:txBody>
       </p:sp>
@@ -1262,38 +1284,37 @@
           <a:p>
             <a:pPr lvl="0"/>
             <a:r>
-              <a:rPr lang="de-DE" smtClean="0"/>
+              <a:rPr lang="de-DE"/>
               <a:t>Textmasterformate durch Klicken bearbeiten</a:t>
             </a:r>
           </a:p>
           <a:p>
             <a:pPr lvl="1"/>
             <a:r>
-              <a:rPr lang="de-DE" smtClean="0"/>
+              <a:rPr lang="de-DE"/>
               <a:t>Zweite Ebene</a:t>
             </a:r>
           </a:p>
           <a:p>
             <a:pPr lvl="2"/>
             <a:r>
-              <a:rPr lang="de-DE" smtClean="0"/>
+              <a:rPr lang="de-DE"/>
               <a:t>Dritte Ebene</a:t>
             </a:r>
           </a:p>
           <a:p>
             <a:pPr lvl="3"/>
             <a:r>
-              <a:rPr lang="de-DE" smtClean="0"/>
+              <a:rPr lang="de-DE"/>
               <a:t>Vierte Ebene</a:t>
             </a:r>
           </a:p>
           <a:p>
             <a:pPr lvl="4"/>
             <a:r>
-              <a:rPr lang="de-DE" smtClean="0"/>
+              <a:rPr lang="de-DE"/>
               <a:t>Fünfte Ebene</a:t>
             </a:r>
-            <a:endParaRPr lang="de-DE"/>
           </a:p>
         </p:txBody>
       </p:sp>
@@ -1314,7 +1335,7 @@
           <a:p>
             <a:fld id="{1BA50D42-C9CD-4801-B293-61D1F53EC57E}" type="datetimeFigureOut">
               <a:rPr lang="de-DE" smtClean="0"/>
-              <a:t>14.09.2006</a:t>
+              <a:t>27.06.2017</a:t>
             </a:fld>
             <a:endParaRPr lang="de-DE"/>
           </a:p>
@@ -1407,10 +1428,9 @@
           </a:lstStyle>
           <a:p>
             <a:r>
-              <a:rPr lang="de-DE" smtClean="0"/>
+              <a:rPr lang="de-DE"/>
               <a:t>Titelmasterformat durch Klicken bearbeiten</a:t>
             </a:r>
-            <a:endParaRPr lang="de-DE"/>
           </a:p>
         </p:txBody>
       </p:sp>
@@ -1473,7 +1493,7 @@
           <a:p>
             <a:pPr lvl="0"/>
             <a:r>
-              <a:rPr lang="de-DE" smtClean="0"/>
+              <a:rPr lang="de-DE"/>
               <a:t>Textmasterformate durch Klicken bearbeiten</a:t>
             </a:r>
           </a:p>
@@ -1529,38 +1549,37 @@
           <a:p>
             <a:pPr lvl="0"/>
             <a:r>
-              <a:rPr lang="de-DE" smtClean="0"/>
+              <a:rPr lang="de-DE"/>
               <a:t>Textmasterformate durch Klicken bearbeiten</a:t>
             </a:r>
           </a:p>
           <a:p>
             <a:pPr lvl="1"/>
             <a:r>
-              <a:rPr lang="de-DE" smtClean="0"/>
+              <a:rPr lang="de-DE"/>
               <a:t>Zweite Ebene</a:t>
             </a:r>
           </a:p>
           <a:p>
             <a:pPr lvl="2"/>
             <a:r>
-              <a:rPr lang="de-DE" smtClean="0"/>
+              <a:rPr lang="de-DE"/>
               <a:t>Dritte Ebene</a:t>
             </a:r>
           </a:p>
           <a:p>
             <a:pPr lvl="3"/>
             <a:r>
-              <a:rPr lang="de-DE" smtClean="0"/>
+              <a:rPr lang="de-DE"/>
               <a:t>Vierte Ebene</a:t>
             </a:r>
           </a:p>
           <a:p>
             <a:pPr lvl="4"/>
             <a:r>
-              <a:rPr lang="de-DE" smtClean="0"/>
+              <a:rPr lang="de-DE"/>
               <a:t>Fünfte Ebene</a:t>
             </a:r>
-            <a:endParaRPr lang="de-DE"/>
           </a:p>
         </p:txBody>
       </p:sp>
@@ -1623,7 +1642,7 @@
           <a:p>
             <a:pPr lvl="0"/>
             <a:r>
-              <a:rPr lang="de-DE" smtClean="0"/>
+              <a:rPr lang="de-DE"/>
               <a:t>Textmasterformate durch Klicken bearbeiten</a:t>
             </a:r>
           </a:p>
@@ -1679,38 +1698,37 @@
           <a:p>
             <a:pPr lvl="0"/>
             <a:r>
-              <a:rPr lang="de-DE" smtClean="0"/>
+              <a:rPr lang="de-DE"/>
               <a:t>Textmasterformate durch Klicken bearbeiten</a:t>
             </a:r>
           </a:p>
           <a:p>
             <a:pPr lvl="1"/>
             <a:r>
-              <a:rPr lang="de-DE" smtClean="0"/>
+              <a:rPr lang="de-DE"/>
               <a:t>Zweite Ebene</a:t>
             </a:r>
           </a:p>
           <a:p>
             <a:pPr lvl="2"/>
             <a:r>
-              <a:rPr lang="de-DE" smtClean="0"/>
+              <a:rPr lang="de-DE"/>
               <a:t>Dritte Ebene</a:t>
             </a:r>
           </a:p>
           <a:p>
             <a:pPr lvl="3"/>
             <a:r>
-              <a:rPr lang="de-DE" smtClean="0"/>
+              <a:rPr lang="de-DE"/>
               <a:t>Vierte Ebene</a:t>
             </a:r>
           </a:p>
           <a:p>
             <a:pPr lvl="4"/>
             <a:r>
-              <a:rPr lang="de-DE" smtClean="0"/>
+              <a:rPr lang="de-DE"/>
               <a:t>Fünfte Ebene</a:t>
             </a:r>
-            <a:endParaRPr lang="de-DE"/>
           </a:p>
         </p:txBody>
       </p:sp>
@@ -1731,7 +1749,7 @@
           <a:p>
             <a:fld id="{1BA50D42-C9CD-4801-B293-61D1F53EC57E}" type="datetimeFigureOut">
               <a:rPr lang="de-DE" smtClean="0"/>
-              <a:t>14.09.2006</a:t>
+              <a:t>27.06.2017</a:t>
             </a:fld>
             <a:endParaRPr lang="de-DE"/>
           </a:p>
@@ -1820,10 +1838,9 @@
           <a:lstStyle/>
           <a:p>
             <a:r>
-              <a:rPr lang="de-DE" smtClean="0"/>
+              <a:rPr lang="de-DE"/>
               <a:t>Titelmasterformat durch Klicken bearbeiten</a:t>
             </a:r>
-            <a:endParaRPr lang="de-DE"/>
           </a:p>
         </p:txBody>
       </p:sp>
@@ -1844,7 +1861,7 @@
           <a:p>
             <a:fld id="{1BA50D42-C9CD-4801-B293-61D1F53EC57E}" type="datetimeFigureOut">
               <a:rPr lang="de-DE" smtClean="0"/>
-              <a:t>14.09.2006</a:t>
+              <a:t>27.06.2017</a:t>
             </a:fld>
             <a:endParaRPr lang="de-DE"/>
           </a:p>
@@ -1934,7 +1951,7 @@
           <a:p>
             <a:fld id="{1BA50D42-C9CD-4801-B293-61D1F53EC57E}" type="datetimeFigureOut">
               <a:rPr lang="de-DE" smtClean="0"/>
-              <a:t>14.09.2006</a:t>
+              <a:t>27.06.2017</a:t>
             </a:fld>
             <a:endParaRPr lang="de-DE"/>
           </a:p>
@@ -2032,10 +2049,9 @@
           </a:lstStyle>
           <a:p>
             <a:r>
-              <a:rPr lang="de-DE" smtClean="0"/>
+              <a:rPr lang="de-DE"/>
               <a:t>Titelmasterformat durch Klicken bearbeiten</a:t>
             </a:r>
-            <a:endParaRPr lang="de-DE"/>
           </a:p>
         </p:txBody>
       </p:sp>
@@ -2089,38 +2105,37 @@
           <a:p>
             <a:pPr lvl="0"/>
             <a:r>
-              <a:rPr lang="de-DE" smtClean="0"/>
+              <a:rPr lang="de-DE"/>
               <a:t>Textmasterformate durch Klicken bearbeiten</a:t>
             </a:r>
           </a:p>
           <a:p>
             <a:pPr lvl="1"/>
             <a:r>
-              <a:rPr lang="de-DE" smtClean="0"/>
+              <a:rPr lang="de-DE"/>
               <a:t>Zweite Ebene</a:t>
             </a:r>
           </a:p>
           <a:p>
             <a:pPr lvl="2"/>
             <a:r>
-              <a:rPr lang="de-DE" smtClean="0"/>
+              <a:rPr lang="de-DE"/>
               <a:t>Dritte Ebene</a:t>
             </a:r>
           </a:p>
           <a:p>
             <a:pPr lvl="3"/>
             <a:r>
-              <a:rPr lang="de-DE" smtClean="0"/>
+              <a:rPr lang="de-DE"/>
               <a:t>Vierte Ebene</a:t>
             </a:r>
           </a:p>
           <a:p>
             <a:pPr lvl="4"/>
             <a:r>
-              <a:rPr lang="de-DE" smtClean="0"/>
+              <a:rPr lang="de-DE"/>
               <a:t>Fünfte Ebene</a:t>
             </a:r>
-            <a:endParaRPr lang="de-DE"/>
           </a:p>
         </p:txBody>
       </p:sp>
@@ -2183,7 +2198,7 @@
           <a:p>
             <a:pPr lvl="0"/>
             <a:r>
-              <a:rPr lang="de-DE" smtClean="0"/>
+              <a:rPr lang="de-DE"/>
               <a:t>Textmasterformate durch Klicken bearbeiten</a:t>
             </a:r>
           </a:p>
@@ -2206,7 +2221,7 @@
           <a:p>
             <a:fld id="{1BA50D42-C9CD-4801-B293-61D1F53EC57E}" type="datetimeFigureOut">
               <a:rPr lang="de-DE" smtClean="0"/>
-              <a:t>14.09.2006</a:t>
+              <a:t>27.06.2017</a:t>
             </a:fld>
             <a:endParaRPr lang="de-DE"/>
           </a:p>
@@ -2304,10 +2319,9 @@
           </a:lstStyle>
           <a:p>
             <a:r>
-              <a:rPr lang="de-DE" smtClean="0"/>
+              <a:rPr lang="de-DE"/>
               <a:t>Titelmasterformat durch Klicken bearbeiten</a:t>
             </a:r>
-            <a:endParaRPr lang="de-DE"/>
           </a:p>
         </p:txBody>
       </p:sp>
@@ -2431,7 +2445,7 @@
           <a:p>
             <a:pPr lvl="0"/>
             <a:r>
-              <a:rPr lang="de-DE" smtClean="0"/>
+              <a:rPr lang="de-DE"/>
               <a:t>Textmasterformate durch Klicken bearbeiten</a:t>
             </a:r>
           </a:p>
@@ -2454,7 +2468,7 @@
           <a:p>
             <a:fld id="{1BA50D42-C9CD-4801-B293-61D1F53EC57E}" type="datetimeFigureOut">
               <a:rPr lang="de-DE" smtClean="0"/>
-              <a:t>14.09.2006</a:t>
+              <a:t>27.06.2017</a:t>
             </a:fld>
             <a:endParaRPr lang="de-DE"/>
           </a:p>
@@ -2558,10 +2572,9 @@
           <a:lstStyle/>
           <a:p>
             <a:r>
-              <a:rPr lang="de-DE" smtClean="0"/>
+              <a:rPr lang="de-DE"/>
               <a:t>Titelmasterformat durch Klicken bearbeiten</a:t>
             </a:r>
-            <a:endParaRPr lang="de-DE"/>
           </a:p>
         </p:txBody>
       </p:sp>
@@ -2592,38 +2605,37 @@
           <a:p>
             <a:pPr lvl="0"/>
             <a:r>
-              <a:rPr lang="de-DE" smtClean="0"/>
+              <a:rPr lang="de-DE"/>
               <a:t>Textmasterformate durch Klicken bearbeiten</a:t>
             </a:r>
           </a:p>
           <a:p>
             <a:pPr lvl="1"/>
             <a:r>
-              <a:rPr lang="de-DE" smtClean="0"/>
+              <a:rPr lang="de-DE"/>
               <a:t>Zweite Ebene</a:t>
             </a:r>
           </a:p>
           <a:p>
             <a:pPr lvl="2"/>
             <a:r>
-              <a:rPr lang="de-DE" smtClean="0"/>
+              <a:rPr lang="de-DE"/>
               <a:t>Dritte Ebene</a:t>
             </a:r>
           </a:p>
           <a:p>
             <a:pPr lvl="3"/>
             <a:r>
-              <a:rPr lang="de-DE" smtClean="0"/>
+              <a:rPr lang="de-DE"/>
               <a:t>Vierte Ebene</a:t>
             </a:r>
           </a:p>
           <a:p>
             <a:pPr lvl="4"/>
             <a:r>
-              <a:rPr lang="de-DE" smtClean="0"/>
+              <a:rPr lang="de-DE"/>
               <a:t>Fünfte Ebene</a:t>
             </a:r>
-            <a:endParaRPr lang="de-DE"/>
           </a:p>
         </p:txBody>
       </p:sp>
@@ -2662,7 +2674,7 @@
           <a:p>
             <a:fld id="{1BA50D42-C9CD-4801-B293-61D1F53EC57E}" type="datetimeFigureOut">
               <a:rPr lang="de-DE" smtClean="0"/>
-              <a:t>14.09.2006</a:t>
+              <a:t>27.06.2017</a:t>
             </a:fld>
             <a:endParaRPr lang="de-DE"/>
           </a:p>
@@ -3015,15 +3027,2270 @@
 </p:sldMaster>
 </file>
 
+<file path=ppt/slides/slide1.xml><?xml version="1.0" encoding="utf-8"?>
+<p:sld xmlns:a="http://schemas.openxmlformats.org/drawingml/2006/main" xmlns:r="http://schemas.openxmlformats.org/officeDocument/2006/relationships" xmlns:p="http://schemas.openxmlformats.org/presentationml/2006/main">
+  <p:cSld>
+    <p:spTree>
+      <p:nvGrpSpPr>
+        <p:cNvPr id="1" name=""/>
+        <p:cNvGrpSpPr/>
+        <p:nvPr/>
+      </p:nvGrpSpPr>
+      <p:grpSpPr>
+        <a:xfrm>
+          <a:off x="0" y="0"/>
+          <a:ext cx="0" cy="0"/>
+          <a:chOff x="0" y="0"/>
+          <a:chExt cx="0" cy="0"/>
+        </a:xfrm>
+      </p:grpSpPr>
+      <p:sp>
+        <p:nvSpPr>
+          <p:cNvPr id="23" name="Rectangle 12"/>
+          <p:cNvSpPr>
+            <a:spLocks noGrp="1" noRot="1" noChangeAspect="1" noMove="1" noResize="1" noEditPoints="1" noAdjustHandles="1" noChangeArrowheads="1" noChangeShapeType="1" noTextEdit="1"/>
+          </p:cNvSpPr>
+          <p:nvPr>
+            <p:extLst>
+              <p:ext uri="{386F3935-93C4-4BCD-93E2-E3B085C9AB24}">
+                <p16:designElem xmlns:p16="http://schemas.microsoft.com/office/powerpoint/2015/main" val="1"/>
+              </p:ext>
+            </p:extLst>
+          </p:nvPr>
+        </p:nvSpPr>
+        <p:spPr bwMode="white">
+          <a:xfrm>
+            <a:off x="0" y="0"/>
+            <a:ext cx="9144000" cy="6858000"/>
+          </a:xfrm>
+          <a:prstGeom prst="rect">
+            <a:avLst/>
+          </a:prstGeom>
+          <a:solidFill>
+            <a:schemeClr val="bg1"/>
+          </a:solidFill>
+          <a:ln>
+            <a:noFill/>
+          </a:ln>
+          <a:effectLst/>
+        </p:spPr>
+      </p:sp>
+      <p:pic>
+        <p:nvPicPr>
+          <p:cNvPr id="8" name="Inhaltsplatzhalter 7" descr="C:\Users\pauls\AppData\Local\Microsoft\Windows\INetCache\Content.Word\logo_paul_10.png">
+            <a:extLst>
+              <a:ext uri="{FF2B5EF4-FFF2-40B4-BE49-F238E27FC236}">
+                <a16:creationId xmlns:a16="http://schemas.microsoft.com/office/drawing/2014/main" id="{30F706AE-F981-492D-9BFC-9535A307A6BC}"/>
+              </a:ext>
+            </a:extLst>
+          </p:cNvPr>
+          <p:cNvPicPr>
+            <a:picLocks noGrp="1"/>
+          </p:cNvPicPr>
+          <p:nvPr>
+            <p:ph idx="1"/>
+          </p:nvPr>
+        </p:nvPicPr>
+        <p:blipFill rotWithShape="1">
+          <a:blip r:embed="rId2" cstate="print">
+            <a:extLst>
+              <a:ext uri="{28A0092B-C50C-407E-A947-70E740481C1C}">
+                <a14:useLocalDpi xmlns:a14="http://schemas.microsoft.com/office/drawing/2010/main" val="0"/>
+              </a:ext>
+            </a:extLst>
+          </a:blip>
+          <a:srcRect/>
+          <a:stretch/>
+        </p:blipFill>
+        <p:spPr bwMode="auto">
+          <a:xfrm>
+            <a:off x="3977268" y="1076940"/>
+            <a:ext cx="4704118" cy="4704118"/>
+          </a:xfrm>
+          <a:prstGeom prst="rect">
+            <a:avLst/>
+          </a:prstGeom>
+          <a:noFill/>
+        </p:spPr>
+      </p:pic>
+      <p:sp>
+        <p:nvSpPr>
+          <p:cNvPr id="15" name="Rectangle 14"/>
+          <p:cNvSpPr>
+            <a:spLocks noGrp="1" noRot="1" noChangeAspect="1" noMove="1" noResize="1" noEditPoints="1" noAdjustHandles="1" noChangeArrowheads="1" noChangeShapeType="1" noTextEdit="1"/>
+          </p:cNvSpPr>
+          <p:nvPr>
+            <p:extLst>
+              <p:ext uri="{386F3935-93C4-4BCD-93E2-E3B085C9AB24}">
+                <p16:designElem xmlns:p16="http://schemas.microsoft.com/office/powerpoint/2015/main" val="1"/>
+              </p:ext>
+            </p:extLst>
+          </p:nvPr>
+        </p:nvSpPr>
+        <p:spPr bwMode="ltGray">
+          <a:xfrm>
+            <a:off x="252664" y="282498"/>
+            <a:ext cx="3249230" cy="6170341"/>
+          </a:xfrm>
+          <a:prstGeom prst="rect">
+            <a:avLst/>
+          </a:prstGeom>
+          <a:solidFill>
+            <a:schemeClr val="tx1">
+              <a:lumMod val="75000"/>
+              <a:lumOff val="25000"/>
+            </a:schemeClr>
+          </a:solidFill>
+          <a:ln w="127000" cap="sq" cmpd="thinThick">
+            <a:solidFill>
+              <a:schemeClr val="tx1">
+                <a:lumMod val="75000"/>
+                <a:lumOff val="25000"/>
+              </a:schemeClr>
+            </a:solidFill>
+          </a:ln>
+        </p:spPr>
+        <p:style>
+          <a:lnRef idx="2">
+            <a:schemeClr val="accent1">
+              <a:shade val="50000"/>
+            </a:schemeClr>
+          </a:lnRef>
+          <a:fillRef idx="1">
+            <a:schemeClr val="accent1"/>
+          </a:fillRef>
+          <a:effectRef idx="0">
+            <a:schemeClr val="accent1"/>
+          </a:effectRef>
+          <a:fontRef idx="minor">
+            <a:schemeClr val="lt1"/>
+          </a:fontRef>
+        </p:style>
+        <p:txBody>
+          <a:bodyPr rtlCol="0" anchor="ctr"/>
+          <a:lstStyle/>
+          <a:p>
+            <a:pPr algn="ctr"/>
+            <a:endParaRPr lang="en-US" sz="1350"/>
+          </a:p>
+        </p:txBody>
+      </p:sp>
+      <p:cxnSp>
+        <p:nvCxnSpPr>
+          <p:cNvPr id="17" name="Straight Connector 16"/>
+          <p:cNvCxnSpPr>
+            <a:cxnSpLocks noGrp="1" noRot="1" noChangeAspect="1" noMove="1" noResize="1" noEditPoints="1" noAdjustHandles="1" noChangeArrowheads="1" noChangeShapeType="1"/>
+          </p:cNvCxnSpPr>
+          <p:nvPr>
+            <p:extLst>
+              <p:ext uri="{386F3935-93C4-4BCD-93E2-E3B085C9AB24}">
+                <p16:designElem xmlns:p16="http://schemas.microsoft.com/office/powerpoint/2015/main" val="1"/>
+              </p:ext>
+            </p:extLst>
+          </p:nvPr>
+        </p:nvCxnSpPr>
+        <p:spPr>
+          <a:xfrm>
+            <a:off x="893344" y="3789950"/>
+            <a:ext cx="1940093" cy="0"/>
+          </a:xfrm>
+          <a:prstGeom prst="line">
+            <a:avLst/>
+          </a:prstGeom>
+          <a:ln w="22225">
+            <a:solidFill>
+              <a:schemeClr val="bg1">
+                <a:lumMod val="85000"/>
+              </a:schemeClr>
+            </a:solidFill>
+          </a:ln>
+        </p:spPr>
+        <p:style>
+          <a:lnRef idx="1">
+            <a:schemeClr val="accent1"/>
+          </a:lnRef>
+          <a:fillRef idx="0">
+            <a:schemeClr val="accent1"/>
+          </a:fillRef>
+          <a:effectRef idx="0">
+            <a:schemeClr val="accent1"/>
+          </a:effectRef>
+          <a:fontRef idx="minor">
+            <a:schemeClr val="tx1"/>
+          </a:fontRef>
+        </p:style>
+      </p:cxnSp>
+      <p:sp>
+        <p:nvSpPr>
+          <p:cNvPr id="2" name="Titel 1">
+            <a:extLst>
+              <a:ext uri="{FF2B5EF4-FFF2-40B4-BE49-F238E27FC236}">
+                <a16:creationId xmlns:a16="http://schemas.microsoft.com/office/drawing/2014/main" id="{89339957-30A7-4191-BF7D-D446022A0006}"/>
+              </a:ext>
+            </a:extLst>
+          </p:cNvPr>
+          <p:cNvSpPr>
+            <a:spLocks noGrp="1"/>
+          </p:cNvSpPr>
+          <p:nvPr>
+            <p:ph type="title"/>
+          </p:nvPr>
+        </p:nvSpPr>
+        <p:spPr>
+          <a:xfrm>
+            <a:off x="505678" y="713678"/>
+            <a:ext cx="2743200" cy="2995057"/>
+          </a:xfrm>
+        </p:spPr>
+        <p:txBody>
+          <a:bodyPr vert="horz" lIns="91440" tIns="45720" rIns="91440" bIns="45720" rtlCol="0" anchor="b">
+            <a:normAutofit/>
+          </a:bodyPr>
+          <a:lstStyle/>
+          <a:p>
+            <a:pPr>
+              <a:lnSpc>
+                <a:spcPct val="90000"/>
+              </a:lnSpc>
+            </a:pPr>
+            <a:r>
+              <a:rPr lang="en-US" sz="3600" dirty="0">
+                <a:solidFill>
+                  <a:schemeClr val="bg1"/>
+                </a:solidFill>
+              </a:rPr>
+              <a:t>Archivist</a:t>
+            </a:r>
+          </a:p>
+        </p:txBody>
+      </p:sp>
+      <p:sp>
+        <p:nvSpPr>
+          <p:cNvPr id="16" name="Titel 1">
+            <a:extLst>
+              <a:ext uri="{FF2B5EF4-FFF2-40B4-BE49-F238E27FC236}">
+                <a16:creationId xmlns:a16="http://schemas.microsoft.com/office/drawing/2014/main" id="{2AFF79B8-44F7-4FD8-9AB7-482435288AC5}"/>
+              </a:ext>
+            </a:extLst>
+          </p:cNvPr>
+          <p:cNvSpPr txBox="1">
+            <a:spLocks/>
+          </p:cNvSpPr>
+          <p:nvPr/>
+        </p:nvSpPr>
+        <p:spPr>
+          <a:xfrm>
+            <a:off x="505678" y="4072449"/>
+            <a:ext cx="2743200" cy="364663"/>
+          </a:xfrm>
+          <a:prstGeom prst="rect">
+            <a:avLst/>
+          </a:prstGeom>
+        </p:spPr>
+        <p:txBody>
+          <a:bodyPr vert="horz" lIns="91440" tIns="45720" rIns="91440" bIns="45720" rtlCol="0" anchor="b">
+            <a:normAutofit/>
+          </a:bodyPr>
+          <a:lstStyle>
+            <a:lvl1pPr algn="ctr" defTabSz="914400" rtl="0" eaLnBrk="1" latinLnBrk="0" hangingPunct="1">
+              <a:spcBef>
+                <a:spcPct val="0"/>
+              </a:spcBef>
+              <a:buNone/>
+              <a:defRPr sz="4400" kern="1200">
+                <a:solidFill>
+                  <a:schemeClr val="tx1"/>
+                </a:solidFill>
+                <a:latin typeface="+mj-lt"/>
+                <a:ea typeface="+mj-ea"/>
+                <a:cs typeface="+mj-cs"/>
+              </a:defRPr>
+            </a:lvl1pPr>
+          </a:lstStyle>
+          <a:p>
+            <a:pPr>
+              <a:lnSpc>
+                <a:spcPct val="90000"/>
+              </a:lnSpc>
+            </a:pPr>
+            <a:r>
+              <a:rPr lang="en-US" sz="1600" dirty="0">
+                <a:solidFill>
+                  <a:schemeClr val="bg1"/>
+                </a:solidFill>
+              </a:rPr>
+              <a:t>by Paul Schmutz &amp; Boris Fuchs</a:t>
+            </a:r>
+          </a:p>
+        </p:txBody>
+      </p:sp>
+    </p:spTree>
+    <p:extLst>
+      <p:ext uri="{BB962C8B-B14F-4D97-AF65-F5344CB8AC3E}">
+        <p14:creationId xmlns:p14="http://schemas.microsoft.com/office/powerpoint/2010/main" val="1368672442"/>
+      </p:ext>
+    </p:extLst>
+  </p:cSld>
+  <p:clrMapOvr>
+    <a:masterClrMapping/>
+  </p:clrMapOvr>
+</p:sld>
+</file>
+
+<file path=ppt/slides/slide10.xml><?xml version="1.0" encoding="utf-8"?>
+<p:sld xmlns:a="http://schemas.openxmlformats.org/drawingml/2006/main" xmlns:r="http://schemas.openxmlformats.org/officeDocument/2006/relationships" xmlns:p="http://schemas.openxmlformats.org/presentationml/2006/main">
+  <p:cSld>
+    <p:spTree>
+      <p:nvGrpSpPr>
+        <p:cNvPr id="1" name=""/>
+        <p:cNvGrpSpPr/>
+        <p:nvPr/>
+      </p:nvGrpSpPr>
+      <p:grpSpPr>
+        <a:xfrm>
+          <a:off x="0" y="0"/>
+          <a:ext cx="0" cy="0"/>
+          <a:chOff x="0" y="0"/>
+          <a:chExt cx="0" cy="0"/>
+        </a:xfrm>
+      </p:grpSpPr>
+      <p:sp>
+        <p:nvSpPr>
+          <p:cNvPr id="2" name="Titel 1">
+            <a:extLst>
+              <a:ext uri="{FF2B5EF4-FFF2-40B4-BE49-F238E27FC236}">
+                <a16:creationId xmlns:a16="http://schemas.microsoft.com/office/drawing/2014/main" id="{DACCC2B6-6A38-4119-A770-CEF2A062B6C6}"/>
+              </a:ext>
+            </a:extLst>
+          </p:cNvPr>
+          <p:cNvSpPr>
+            <a:spLocks noGrp="1"/>
+          </p:cNvSpPr>
+          <p:nvPr>
+            <p:ph type="title"/>
+          </p:nvPr>
+        </p:nvSpPr>
+        <p:spPr>
+          <a:xfrm>
+            <a:off x="457200" y="274638"/>
+            <a:ext cx="8229600" cy="1143000"/>
+          </a:xfrm>
+          <a:solidFill>
+            <a:srgbClr val="8F111A"/>
+          </a:solidFill>
+          <a:ln w="12700">
+            <a:solidFill>
+              <a:schemeClr val="tx1"/>
+            </a:solidFill>
+          </a:ln>
+        </p:spPr>
+        <p:txBody>
+          <a:bodyPr/>
+          <a:lstStyle/>
+          <a:p>
+            <a:r>
+              <a:rPr lang="de-AT" dirty="0"/>
+              <a:t>Funktionalität 2</a:t>
+            </a:r>
+          </a:p>
+        </p:txBody>
+      </p:sp>
+      <p:pic>
+        <p:nvPicPr>
+          <p:cNvPr id="4" name="Grafik 3">
+            <a:extLst>
+              <a:ext uri="{FF2B5EF4-FFF2-40B4-BE49-F238E27FC236}">
+                <a16:creationId xmlns:a16="http://schemas.microsoft.com/office/drawing/2014/main" id="{E9D33F78-1996-4E75-803D-E403CAEE3DAC}"/>
+              </a:ext>
+            </a:extLst>
+          </p:cNvPr>
+          <p:cNvPicPr>
+            <a:picLocks noChangeAspect="1"/>
+          </p:cNvPicPr>
+          <p:nvPr/>
+        </p:nvPicPr>
+        <p:blipFill>
+          <a:blip r:embed="rId2"/>
+          <a:stretch>
+            <a:fillRect/>
+          </a:stretch>
+        </p:blipFill>
+        <p:spPr>
+          <a:xfrm>
+            <a:off x="611560" y="313271"/>
+            <a:ext cx="1020471" cy="1065734"/>
+          </a:xfrm>
+          <a:prstGeom prst="rect">
+            <a:avLst/>
+          </a:prstGeom>
+        </p:spPr>
+      </p:pic>
+      <p:sp>
+        <p:nvSpPr>
+          <p:cNvPr id="6" name="Inhaltsplatzhalter 2">
+            <a:extLst>
+              <a:ext uri="{FF2B5EF4-FFF2-40B4-BE49-F238E27FC236}">
+                <a16:creationId xmlns:a16="http://schemas.microsoft.com/office/drawing/2014/main" id="{8F150A8E-6E58-403F-9E50-7E315F8A5B6A}"/>
+              </a:ext>
+            </a:extLst>
+          </p:cNvPr>
+          <p:cNvSpPr>
+            <a:spLocks noGrp="1"/>
+          </p:cNvSpPr>
+          <p:nvPr>
+            <p:ph idx="1"/>
+          </p:nvPr>
+        </p:nvSpPr>
+        <p:spPr>
+          <a:xfrm>
+            <a:off x="457200" y="1844824"/>
+            <a:ext cx="8229600" cy="4680520"/>
+          </a:xfrm>
+        </p:spPr>
+        <p:txBody>
+          <a:bodyPr>
+            <a:normAutofit/>
+          </a:bodyPr>
+          <a:lstStyle/>
+          <a:p>
+            <a:pPr marL="0" indent="0">
+              <a:buNone/>
+            </a:pPr>
+            <a:r>
+              <a:rPr lang="de-AT" sz="4000" u="sng" dirty="0" err="1"/>
+              <a:t>Archivist</a:t>
+            </a:r>
+            <a:r>
+              <a:rPr lang="de-AT" sz="4000" u="sng" dirty="0"/>
+              <a:t>:</a:t>
+            </a:r>
+          </a:p>
+          <a:p>
+            <a:pPr marL="0" indent="0">
+              <a:buNone/>
+            </a:pPr>
+            <a:r>
+              <a:rPr lang="de-AT" sz="3600" dirty="0"/>
+              <a:t>Speichern…</a:t>
+            </a:r>
+          </a:p>
+          <a:p>
+            <a:pPr marL="0" indent="0">
+              <a:buNone/>
+            </a:pPr>
+            <a:r>
+              <a:rPr lang="de-AT" sz="3600" dirty="0"/>
+              <a:t>Verwalten…</a:t>
+            </a:r>
+          </a:p>
+          <a:p>
+            <a:pPr marL="0" indent="0">
+              <a:buNone/>
+            </a:pPr>
+            <a:r>
+              <a:rPr lang="de-AT" sz="3600" dirty="0"/>
+              <a:t>Suche…</a:t>
+            </a:r>
+          </a:p>
+          <a:p>
+            <a:pPr marL="0" indent="0">
+              <a:buNone/>
+            </a:pPr>
+            <a:r>
+              <a:rPr lang="de-AT" sz="3600" dirty="0"/>
+              <a:t>		von Noten-</a:t>
+            </a:r>
+            <a:r>
+              <a:rPr lang="de-AT" sz="3600" dirty="0" err="1"/>
+              <a:t>PDF`s</a:t>
+            </a:r>
+            <a:endParaRPr lang="de-AT" sz="3600" dirty="0"/>
+          </a:p>
+          <a:p>
+            <a:pPr marL="0" indent="0">
+              <a:buNone/>
+            </a:pPr>
+            <a:endParaRPr lang="de-AT" sz="3600" dirty="0"/>
+          </a:p>
+          <a:p>
+            <a:pPr marL="0" indent="0">
+              <a:buNone/>
+            </a:pPr>
+            <a:r>
+              <a:rPr lang="de-AT" sz="3600" dirty="0"/>
+              <a:t>-&gt; Live Test</a:t>
+            </a:r>
+            <a:endParaRPr lang="de-AT" sz="2800" dirty="0"/>
+          </a:p>
+        </p:txBody>
+      </p:sp>
+    </p:spTree>
+    <p:extLst>
+      <p:ext uri="{BB962C8B-B14F-4D97-AF65-F5344CB8AC3E}">
+        <p14:creationId xmlns:p14="http://schemas.microsoft.com/office/powerpoint/2010/main" val="1859143567"/>
+      </p:ext>
+    </p:extLst>
+  </p:cSld>
+  <p:clrMapOvr>
+    <a:masterClrMapping/>
+  </p:clrMapOvr>
+</p:sld>
+</file>
+
+<file path=ppt/slides/slide11.xml><?xml version="1.0" encoding="utf-8"?>
+<p:sld xmlns:a="http://schemas.openxmlformats.org/drawingml/2006/main" xmlns:r="http://schemas.openxmlformats.org/officeDocument/2006/relationships" xmlns:p="http://schemas.openxmlformats.org/presentationml/2006/main">
+  <p:cSld>
+    <p:spTree>
+      <p:nvGrpSpPr>
+        <p:cNvPr id="1" name=""/>
+        <p:cNvGrpSpPr/>
+        <p:nvPr/>
+      </p:nvGrpSpPr>
+      <p:grpSpPr>
+        <a:xfrm>
+          <a:off x="0" y="0"/>
+          <a:ext cx="0" cy="0"/>
+          <a:chOff x="0" y="0"/>
+          <a:chExt cx="0" cy="0"/>
+        </a:xfrm>
+      </p:grpSpPr>
+      <p:sp>
+        <p:nvSpPr>
+          <p:cNvPr id="2" name="Titel 1">
+            <a:extLst>
+              <a:ext uri="{FF2B5EF4-FFF2-40B4-BE49-F238E27FC236}">
+                <a16:creationId xmlns:a16="http://schemas.microsoft.com/office/drawing/2014/main" id="{DACCC2B6-6A38-4119-A770-CEF2A062B6C6}"/>
+              </a:ext>
+            </a:extLst>
+          </p:cNvPr>
+          <p:cNvSpPr>
+            <a:spLocks noGrp="1"/>
+          </p:cNvSpPr>
+          <p:nvPr>
+            <p:ph type="title"/>
+          </p:nvPr>
+        </p:nvSpPr>
+        <p:spPr>
+          <a:xfrm>
+            <a:off x="457200" y="274638"/>
+            <a:ext cx="8229600" cy="1143000"/>
+          </a:xfrm>
+          <a:solidFill>
+            <a:srgbClr val="8F111A"/>
+          </a:solidFill>
+          <a:ln w="12700">
+            <a:solidFill>
+              <a:schemeClr val="tx1"/>
+            </a:solidFill>
+          </a:ln>
+        </p:spPr>
+        <p:txBody>
+          <a:bodyPr/>
+          <a:lstStyle/>
+          <a:p>
+            <a:r>
+              <a:rPr lang="de-AT" dirty="0"/>
+              <a:t>Ausblick</a:t>
+            </a:r>
+          </a:p>
+        </p:txBody>
+      </p:sp>
+      <p:pic>
+        <p:nvPicPr>
+          <p:cNvPr id="4" name="Grafik 3">
+            <a:extLst>
+              <a:ext uri="{FF2B5EF4-FFF2-40B4-BE49-F238E27FC236}">
+                <a16:creationId xmlns:a16="http://schemas.microsoft.com/office/drawing/2014/main" id="{E9D33F78-1996-4E75-803D-E403CAEE3DAC}"/>
+              </a:ext>
+            </a:extLst>
+          </p:cNvPr>
+          <p:cNvPicPr>
+            <a:picLocks noChangeAspect="1"/>
+          </p:cNvPicPr>
+          <p:nvPr/>
+        </p:nvPicPr>
+        <p:blipFill>
+          <a:blip r:embed="rId2"/>
+          <a:stretch>
+            <a:fillRect/>
+          </a:stretch>
+        </p:blipFill>
+        <p:spPr>
+          <a:xfrm>
+            <a:off x="611560" y="313271"/>
+            <a:ext cx="1020471" cy="1065734"/>
+          </a:xfrm>
+          <a:prstGeom prst="rect">
+            <a:avLst/>
+          </a:prstGeom>
+        </p:spPr>
+      </p:pic>
+      <p:sp>
+        <p:nvSpPr>
+          <p:cNvPr id="5" name="Inhaltsplatzhalter 2">
+            <a:extLst>
+              <a:ext uri="{FF2B5EF4-FFF2-40B4-BE49-F238E27FC236}">
+                <a16:creationId xmlns:a16="http://schemas.microsoft.com/office/drawing/2014/main" id="{9D8DA2B0-7BB3-4C55-B29A-2F68CA08123B}"/>
+              </a:ext>
+            </a:extLst>
+          </p:cNvPr>
+          <p:cNvSpPr>
+            <a:spLocks noGrp="1"/>
+          </p:cNvSpPr>
+          <p:nvPr>
+            <p:ph idx="1"/>
+          </p:nvPr>
+        </p:nvSpPr>
+        <p:spPr>
+          <a:xfrm>
+            <a:off x="457200" y="1844824"/>
+            <a:ext cx="8229600" cy="4608512"/>
+          </a:xfrm>
+        </p:spPr>
+        <p:txBody>
+          <a:bodyPr>
+            <a:normAutofit/>
+          </a:bodyPr>
+          <a:lstStyle/>
+          <a:p>
+            <a:r>
+              <a:rPr lang="de-AT" sz="4000" dirty="0"/>
+              <a:t>Implementierung einer APP</a:t>
+            </a:r>
+          </a:p>
+          <a:p>
+            <a:r>
+              <a:rPr lang="de-AT" sz="4000" dirty="0"/>
+              <a:t>Verwaltung von Usern </a:t>
+            </a:r>
+          </a:p>
+          <a:p>
+            <a:r>
+              <a:rPr lang="de-AT" sz="4000" dirty="0"/>
+              <a:t>Anlegen von „Mappen“</a:t>
+            </a:r>
+          </a:p>
+          <a:p>
+            <a:r>
+              <a:rPr lang="de-AT" sz="4000" dirty="0"/>
+              <a:t>Switch von </a:t>
+            </a:r>
+            <a:r>
+              <a:rPr lang="de-AT" sz="4000" dirty="0" err="1"/>
+              <a:t>WildFly</a:t>
+            </a:r>
+            <a:r>
+              <a:rPr lang="de-AT" sz="4000" dirty="0"/>
+              <a:t> auf „echten“ Server</a:t>
+            </a:r>
+          </a:p>
+        </p:txBody>
+      </p:sp>
+    </p:spTree>
+    <p:extLst>
+      <p:ext uri="{BB962C8B-B14F-4D97-AF65-F5344CB8AC3E}">
+        <p14:creationId xmlns:p14="http://schemas.microsoft.com/office/powerpoint/2010/main" val="962354881"/>
+      </p:ext>
+    </p:extLst>
+  </p:cSld>
+  <p:clrMapOvr>
+    <a:masterClrMapping/>
+  </p:clrMapOvr>
+</p:sld>
+</file>
+
+<file path=ppt/slides/slide2.xml><?xml version="1.0" encoding="utf-8"?>
+<p:sld xmlns:a="http://schemas.openxmlformats.org/drawingml/2006/main" xmlns:r="http://schemas.openxmlformats.org/officeDocument/2006/relationships" xmlns:p="http://schemas.openxmlformats.org/presentationml/2006/main">
+  <p:cSld>
+    <p:spTree>
+      <p:nvGrpSpPr>
+        <p:cNvPr id="1" name=""/>
+        <p:cNvGrpSpPr/>
+        <p:nvPr/>
+      </p:nvGrpSpPr>
+      <p:grpSpPr>
+        <a:xfrm>
+          <a:off x="0" y="0"/>
+          <a:ext cx="0" cy="0"/>
+          <a:chOff x="0" y="0"/>
+          <a:chExt cx="0" cy="0"/>
+        </a:xfrm>
+      </p:grpSpPr>
+      <p:sp>
+        <p:nvSpPr>
+          <p:cNvPr id="2" name="Titel 1">
+            <a:extLst>
+              <a:ext uri="{FF2B5EF4-FFF2-40B4-BE49-F238E27FC236}">
+                <a16:creationId xmlns:a16="http://schemas.microsoft.com/office/drawing/2014/main" id="{DACCC2B6-6A38-4119-A770-CEF2A062B6C6}"/>
+              </a:ext>
+            </a:extLst>
+          </p:cNvPr>
+          <p:cNvSpPr>
+            <a:spLocks noGrp="1"/>
+          </p:cNvSpPr>
+          <p:nvPr>
+            <p:ph type="title"/>
+          </p:nvPr>
+        </p:nvSpPr>
+        <p:spPr>
+          <a:xfrm>
+            <a:off x="457200" y="274638"/>
+            <a:ext cx="8229600" cy="1143000"/>
+          </a:xfrm>
+          <a:solidFill>
+            <a:srgbClr val="8F111A"/>
+          </a:solidFill>
+          <a:ln w="12700">
+            <a:solidFill>
+              <a:schemeClr val="tx1"/>
+            </a:solidFill>
+          </a:ln>
+        </p:spPr>
+        <p:txBody>
+          <a:bodyPr/>
+          <a:lstStyle/>
+          <a:p>
+            <a:r>
+              <a:rPr lang="de-AT" dirty="0"/>
+              <a:t>Übersicht</a:t>
+            </a:r>
+          </a:p>
+        </p:txBody>
+      </p:sp>
+      <p:sp>
+        <p:nvSpPr>
+          <p:cNvPr id="3" name="Inhaltsplatzhalter 2">
+            <a:extLst>
+              <a:ext uri="{FF2B5EF4-FFF2-40B4-BE49-F238E27FC236}">
+                <a16:creationId xmlns:a16="http://schemas.microsoft.com/office/drawing/2014/main" id="{317DEE44-C5AC-473A-A65D-E44B3A3D9802}"/>
+              </a:ext>
+            </a:extLst>
+          </p:cNvPr>
+          <p:cNvSpPr>
+            <a:spLocks noGrp="1"/>
+          </p:cNvSpPr>
+          <p:nvPr>
+            <p:ph idx="1"/>
+          </p:nvPr>
+        </p:nvSpPr>
+        <p:spPr>
+          <a:xfrm>
+            <a:off x="457200" y="2420888"/>
+            <a:ext cx="8229600" cy="3917032"/>
+          </a:xfrm>
+        </p:spPr>
+        <p:txBody>
+          <a:bodyPr>
+            <a:normAutofit fontScale="92500" lnSpcReduction="10000"/>
+          </a:bodyPr>
+          <a:lstStyle/>
+          <a:p>
+            <a:r>
+              <a:rPr lang="de-AT" sz="4000" dirty="0"/>
+              <a:t>Motivation</a:t>
+            </a:r>
+          </a:p>
+          <a:p>
+            <a:r>
+              <a:rPr lang="de-AT" sz="4000" dirty="0"/>
+              <a:t>Umsetzung</a:t>
+            </a:r>
+          </a:p>
+          <a:p>
+            <a:r>
+              <a:rPr lang="de-AT" sz="4000" dirty="0"/>
+              <a:t>Implementierung</a:t>
+            </a:r>
+          </a:p>
+          <a:p>
+            <a:r>
+              <a:rPr lang="de-AT" sz="4000" dirty="0"/>
+              <a:t>Funktionalität</a:t>
+            </a:r>
+          </a:p>
+          <a:p>
+            <a:r>
+              <a:rPr lang="de-AT" sz="4000" dirty="0"/>
+              <a:t>Live-Test</a:t>
+            </a:r>
+          </a:p>
+          <a:p>
+            <a:r>
+              <a:rPr lang="de-AT" sz="4000" dirty="0"/>
+              <a:t>Ausblick</a:t>
+            </a:r>
+          </a:p>
+        </p:txBody>
+      </p:sp>
+      <p:pic>
+        <p:nvPicPr>
+          <p:cNvPr id="4" name="Grafik 3">
+            <a:extLst>
+              <a:ext uri="{FF2B5EF4-FFF2-40B4-BE49-F238E27FC236}">
+                <a16:creationId xmlns:a16="http://schemas.microsoft.com/office/drawing/2014/main" id="{E9D33F78-1996-4E75-803D-E403CAEE3DAC}"/>
+              </a:ext>
+            </a:extLst>
+          </p:cNvPr>
+          <p:cNvPicPr>
+            <a:picLocks noChangeAspect="1"/>
+          </p:cNvPicPr>
+          <p:nvPr/>
+        </p:nvPicPr>
+        <p:blipFill>
+          <a:blip r:embed="rId2"/>
+          <a:stretch>
+            <a:fillRect/>
+          </a:stretch>
+        </p:blipFill>
+        <p:spPr>
+          <a:xfrm>
+            <a:off x="611560" y="313271"/>
+            <a:ext cx="1020471" cy="1065734"/>
+          </a:xfrm>
+          <a:prstGeom prst="rect">
+            <a:avLst/>
+          </a:prstGeom>
+        </p:spPr>
+      </p:pic>
+    </p:spTree>
+    <p:extLst>
+      <p:ext uri="{BB962C8B-B14F-4D97-AF65-F5344CB8AC3E}">
+        <p14:creationId xmlns:p14="http://schemas.microsoft.com/office/powerpoint/2010/main" val="3024211158"/>
+      </p:ext>
+    </p:extLst>
+  </p:cSld>
+  <p:clrMapOvr>
+    <a:masterClrMapping/>
+  </p:clrMapOvr>
+</p:sld>
+</file>
+
+<file path=ppt/slides/slide3.xml><?xml version="1.0" encoding="utf-8"?>
+<p:sld xmlns:a="http://schemas.openxmlformats.org/drawingml/2006/main" xmlns:r="http://schemas.openxmlformats.org/officeDocument/2006/relationships" xmlns:p="http://schemas.openxmlformats.org/presentationml/2006/main">
+  <p:cSld>
+    <p:spTree>
+      <p:nvGrpSpPr>
+        <p:cNvPr id="1" name=""/>
+        <p:cNvGrpSpPr/>
+        <p:nvPr/>
+      </p:nvGrpSpPr>
+      <p:grpSpPr>
+        <a:xfrm>
+          <a:off x="0" y="0"/>
+          <a:ext cx="0" cy="0"/>
+          <a:chOff x="0" y="0"/>
+          <a:chExt cx="0" cy="0"/>
+        </a:xfrm>
+      </p:grpSpPr>
+      <p:sp>
+        <p:nvSpPr>
+          <p:cNvPr id="2" name="Titel 1">
+            <a:extLst>
+              <a:ext uri="{FF2B5EF4-FFF2-40B4-BE49-F238E27FC236}">
+                <a16:creationId xmlns:a16="http://schemas.microsoft.com/office/drawing/2014/main" id="{DACCC2B6-6A38-4119-A770-CEF2A062B6C6}"/>
+              </a:ext>
+            </a:extLst>
+          </p:cNvPr>
+          <p:cNvSpPr>
+            <a:spLocks noGrp="1"/>
+          </p:cNvSpPr>
+          <p:nvPr>
+            <p:ph type="title"/>
+          </p:nvPr>
+        </p:nvSpPr>
+        <p:spPr>
+          <a:xfrm>
+            <a:off x="457200" y="274638"/>
+            <a:ext cx="8229600" cy="1143000"/>
+          </a:xfrm>
+          <a:solidFill>
+            <a:srgbClr val="8F111A"/>
+          </a:solidFill>
+          <a:ln w="12700">
+            <a:solidFill>
+              <a:schemeClr val="tx1"/>
+            </a:solidFill>
+          </a:ln>
+        </p:spPr>
+        <p:txBody>
+          <a:bodyPr/>
+          <a:lstStyle/>
+          <a:p>
+            <a:r>
+              <a:rPr lang="de-AT" dirty="0"/>
+              <a:t>Motivation</a:t>
+            </a:r>
+          </a:p>
+        </p:txBody>
+      </p:sp>
+      <p:sp>
+        <p:nvSpPr>
+          <p:cNvPr id="3" name="Inhaltsplatzhalter 2">
+            <a:extLst>
+              <a:ext uri="{FF2B5EF4-FFF2-40B4-BE49-F238E27FC236}">
+                <a16:creationId xmlns:a16="http://schemas.microsoft.com/office/drawing/2014/main" id="{317DEE44-C5AC-473A-A65D-E44B3A3D9802}"/>
+              </a:ext>
+            </a:extLst>
+          </p:cNvPr>
+          <p:cNvSpPr>
+            <a:spLocks noGrp="1"/>
+          </p:cNvSpPr>
+          <p:nvPr>
+            <p:ph idx="1"/>
+          </p:nvPr>
+        </p:nvSpPr>
+        <p:spPr>
+          <a:xfrm>
+            <a:off x="457200" y="2420888"/>
+            <a:ext cx="8229600" cy="3917032"/>
+          </a:xfrm>
+        </p:spPr>
+        <p:txBody>
+          <a:bodyPr>
+            <a:normAutofit/>
+          </a:bodyPr>
+          <a:lstStyle/>
+          <a:p>
+            <a:pPr marL="0" indent="0">
+              <a:buNone/>
+            </a:pPr>
+            <a:r>
+              <a:rPr lang="de-AT" sz="4000" dirty="0"/>
+              <a:t>Programm….</a:t>
+            </a:r>
+          </a:p>
+          <a:p>
+            <a:pPr marL="0" indent="0">
+              <a:buNone/>
+            </a:pPr>
+            <a:r>
+              <a:rPr lang="de-AT" sz="4000" dirty="0"/>
+              <a:t>	…mit realem Bedarf</a:t>
+            </a:r>
+          </a:p>
+          <a:p>
+            <a:pPr marL="0" indent="0">
+              <a:buNone/>
+            </a:pPr>
+            <a:r>
+              <a:rPr lang="de-AT" sz="4000" dirty="0"/>
+              <a:t>	…mit Ausbaupotential</a:t>
+            </a:r>
+          </a:p>
+          <a:p>
+            <a:pPr marL="0" indent="0">
+              <a:buNone/>
+            </a:pPr>
+            <a:r>
+              <a:rPr lang="de-AT" sz="4000" dirty="0"/>
+              <a:t>	…mit Bezug zu Teammitglied</a:t>
+            </a:r>
+          </a:p>
+          <a:p>
+            <a:pPr marL="0" indent="0">
+              <a:buNone/>
+            </a:pPr>
+            <a:r>
+              <a:rPr lang="de-AT" sz="4000" dirty="0"/>
+              <a:t>	…mit …</a:t>
+            </a:r>
+          </a:p>
+        </p:txBody>
+      </p:sp>
+      <p:pic>
+        <p:nvPicPr>
+          <p:cNvPr id="4" name="Grafik 3">
+            <a:extLst>
+              <a:ext uri="{FF2B5EF4-FFF2-40B4-BE49-F238E27FC236}">
+                <a16:creationId xmlns:a16="http://schemas.microsoft.com/office/drawing/2014/main" id="{E9D33F78-1996-4E75-803D-E403CAEE3DAC}"/>
+              </a:ext>
+            </a:extLst>
+          </p:cNvPr>
+          <p:cNvPicPr>
+            <a:picLocks noChangeAspect="1"/>
+          </p:cNvPicPr>
+          <p:nvPr/>
+        </p:nvPicPr>
+        <p:blipFill>
+          <a:blip r:embed="rId2"/>
+          <a:stretch>
+            <a:fillRect/>
+          </a:stretch>
+        </p:blipFill>
+        <p:spPr>
+          <a:xfrm>
+            <a:off x="611560" y="313271"/>
+            <a:ext cx="1020471" cy="1065734"/>
+          </a:xfrm>
+          <a:prstGeom prst="rect">
+            <a:avLst/>
+          </a:prstGeom>
+        </p:spPr>
+      </p:pic>
+    </p:spTree>
+    <p:extLst>
+      <p:ext uri="{BB962C8B-B14F-4D97-AF65-F5344CB8AC3E}">
+        <p14:creationId xmlns:p14="http://schemas.microsoft.com/office/powerpoint/2010/main" val="573968402"/>
+      </p:ext>
+    </p:extLst>
+  </p:cSld>
+  <p:clrMapOvr>
+    <a:masterClrMapping/>
+  </p:clrMapOvr>
+</p:sld>
+</file>
+
+<file path=ppt/slides/slide4.xml><?xml version="1.0" encoding="utf-8"?>
+<p:sld xmlns:a="http://schemas.openxmlformats.org/drawingml/2006/main" xmlns:r="http://schemas.openxmlformats.org/officeDocument/2006/relationships" xmlns:p="http://schemas.openxmlformats.org/presentationml/2006/main">
+  <p:cSld>
+    <p:spTree>
+      <p:nvGrpSpPr>
+        <p:cNvPr id="1" name=""/>
+        <p:cNvGrpSpPr/>
+        <p:nvPr/>
+      </p:nvGrpSpPr>
+      <p:grpSpPr>
+        <a:xfrm>
+          <a:off x="0" y="0"/>
+          <a:ext cx="0" cy="0"/>
+          <a:chOff x="0" y="0"/>
+          <a:chExt cx="0" cy="0"/>
+        </a:xfrm>
+      </p:grpSpPr>
+      <p:sp>
+        <p:nvSpPr>
+          <p:cNvPr id="2" name="Titel 1">
+            <a:extLst>
+              <a:ext uri="{FF2B5EF4-FFF2-40B4-BE49-F238E27FC236}">
+                <a16:creationId xmlns:a16="http://schemas.microsoft.com/office/drawing/2014/main" id="{DACCC2B6-6A38-4119-A770-CEF2A062B6C6}"/>
+              </a:ext>
+            </a:extLst>
+          </p:cNvPr>
+          <p:cNvSpPr>
+            <a:spLocks noGrp="1"/>
+          </p:cNvSpPr>
+          <p:nvPr>
+            <p:ph type="title"/>
+          </p:nvPr>
+        </p:nvSpPr>
+        <p:spPr>
+          <a:xfrm>
+            <a:off x="457200" y="274638"/>
+            <a:ext cx="8229600" cy="1143000"/>
+          </a:xfrm>
+          <a:solidFill>
+            <a:srgbClr val="8F111A"/>
+          </a:solidFill>
+          <a:ln w="12700">
+            <a:solidFill>
+              <a:schemeClr val="tx1"/>
+            </a:solidFill>
+          </a:ln>
+        </p:spPr>
+        <p:txBody>
+          <a:bodyPr/>
+          <a:lstStyle/>
+          <a:p>
+            <a:r>
+              <a:rPr lang="de-AT" dirty="0"/>
+              <a:t>Umsetzung</a:t>
+            </a:r>
+          </a:p>
+        </p:txBody>
+      </p:sp>
+      <p:sp>
+        <p:nvSpPr>
+          <p:cNvPr id="3" name="Inhaltsplatzhalter 2">
+            <a:extLst>
+              <a:ext uri="{FF2B5EF4-FFF2-40B4-BE49-F238E27FC236}">
+                <a16:creationId xmlns:a16="http://schemas.microsoft.com/office/drawing/2014/main" id="{317DEE44-C5AC-473A-A65D-E44B3A3D9802}"/>
+              </a:ext>
+            </a:extLst>
+          </p:cNvPr>
+          <p:cNvSpPr>
+            <a:spLocks noGrp="1"/>
+          </p:cNvSpPr>
+          <p:nvPr>
+            <p:ph idx="1"/>
+          </p:nvPr>
+        </p:nvSpPr>
+        <p:spPr>
+          <a:xfrm>
+            <a:off x="457200" y="2420888"/>
+            <a:ext cx="8229600" cy="3456384"/>
+          </a:xfrm>
+        </p:spPr>
+        <p:txBody>
+          <a:bodyPr>
+            <a:normAutofit/>
+          </a:bodyPr>
+          <a:lstStyle/>
+          <a:p>
+            <a:r>
+              <a:rPr lang="de-AT" sz="4000" dirty="0"/>
+              <a:t>Gewusst wie…?</a:t>
+            </a:r>
+          </a:p>
+          <a:p>
+            <a:r>
+              <a:rPr lang="de-AT" sz="4000" dirty="0"/>
+              <a:t>APP oder nicht APP?</a:t>
+            </a:r>
+          </a:p>
+          <a:p>
+            <a:r>
+              <a:rPr lang="de-AT" sz="4000" dirty="0"/>
+              <a:t>Entscheidung: Webservice!?</a:t>
+            </a:r>
+          </a:p>
+          <a:p>
+            <a:pPr marL="0" indent="0">
+              <a:buNone/>
+            </a:pPr>
+            <a:endParaRPr lang="de-AT" sz="4000" dirty="0"/>
+          </a:p>
+          <a:p>
+            <a:endParaRPr lang="de-AT" sz="4000" dirty="0"/>
+          </a:p>
+          <a:p>
+            <a:endParaRPr lang="de-AT" sz="4000" dirty="0"/>
+          </a:p>
+        </p:txBody>
+      </p:sp>
+      <p:pic>
+        <p:nvPicPr>
+          <p:cNvPr id="4" name="Grafik 3">
+            <a:extLst>
+              <a:ext uri="{FF2B5EF4-FFF2-40B4-BE49-F238E27FC236}">
+                <a16:creationId xmlns:a16="http://schemas.microsoft.com/office/drawing/2014/main" id="{E9D33F78-1996-4E75-803D-E403CAEE3DAC}"/>
+              </a:ext>
+            </a:extLst>
+          </p:cNvPr>
+          <p:cNvPicPr>
+            <a:picLocks noChangeAspect="1"/>
+          </p:cNvPicPr>
+          <p:nvPr/>
+        </p:nvPicPr>
+        <p:blipFill>
+          <a:blip r:embed="rId2"/>
+          <a:stretch>
+            <a:fillRect/>
+          </a:stretch>
+        </p:blipFill>
+        <p:spPr>
+          <a:xfrm>
+            <a:off x="611560" y="313271"/>
+            <a:ext cx="1020471" cy="1065734"/>
+          </a:xfrm>
+          <a:prstGeom prst="rect">
+            <a:avLst/>
+          </a:prstGeom>
+        </p:spPr>
+      </p:pic>
+    </p:spTree>
+    <p:extLst>
+      <p:ext uri="{BB962C8B-B14F-4D97-AF65-F5344CB8AC3E}">
+        <p14:creationId xmlns:p14="http://schemas.microsoft.com/office/powerpoint/2010/main" val="3232785068"/>
+      </p:ext>
+    </p:extLst>
+  </p:cSld>
+  <p:clrMapOvr>
+    <a:masterClrMapping/>
+  </p:clrMapOvr>
+</p:sld>
+</file>
+
+<file path=ppt/slides/slide5.xml><?xml version="1.0" encoding="utf-8"?>
+<p:sld xmlns:a="http://schemas.openxmlformats.org/drawingml/2006/main" xmlns:r="http://schemas.openxmlformats.org/officeDocument/2006/relationships" xmlns:p="http://schemas.openxmlformats.org/presentationml/2006/main">
+  <p:cSld>
+    <p:spTree>
+      <p:nvGrpSpPr>
+        <p:cNvPr id="1" name=""/>
+        <p:cNvGrpSpPr/>
+        <p:nvPr/>
+      </p:nvGrpSpPr>
+      <p:grpSpPr>
+        <a:xfrm>
+          <a:off x="0" y="0"/>
+          <a:ext cx="0" cy="0"/>
+          <a:chOff x="0" y="0"/>
+          <a:chExt cx="0" cy="0"/>
+        </a:xfrm>
+      </p:grpSpPr>
+      <p:sp>
+        <p:nvSpPr>
+          <p:cNvPr id="2" name="Titel 1">
+            <a:extLst>
+              <a:ext uri="{FF2B5EF4-FFF2-40B4-BE49-F238E27FC236}">
+                <a16:creationId xmlns:a16="http://schemas.microsoft.com/office/drawing/2014/main" id="{DACCC2B6-6A38-4119-A770-CEF2A062B6C6}"/>
+              </a:ext>
+            </a:extLst>
+          </p:cNvPr>
+          <p:cNvSpPr>
+            <a:spLocks noGrp="1"/>
+          </p:cNvSpPr>
+          <p:nvPr>
+            <p:ph type="title"/>
+          </p:nvPr>
+        </p:nvSpPr>
+        <p:spPr>
+          <a:xfrm>
+            <a:off x="457200" y="274638"/>
+            <a:ext cx="8229600" cy="1143000"/>
+          </a:xfrm>
+          <a:solidFill>
+            <a:srgbClr val="8F111A"/>
+          </a:solidFill>
+          <a:ln w="12700">
+            <a:solidFill>
+              <a:schemeClr val="tx1"/>
+            </a:solidFill>
+          </a:ln>
+        </p:spPr>
+        <p:txBody>
+          <a:bodyPr/>
+          <a:lstStyle/>
+          <a:p>
+            <a:r>
+              <a:rPr lang="de-AT" dirty="0"/>
+              <a:t>Implementierung 1</a:t>
+            </a:r>
+          </a:p>
+        </p:txBody>
+      </p:sp>
+      <p:pic>
+        <p:nvPicPr>
+          <p:cNvPr id="4" name="Grafik 3">
+            <a:extLst>
+              <a:ext uri="{FF2B5EF4-FFF2-40B4-BE49-F238E27FC236}">
+                <a16:creationId xmlns:a16="http://schemas.microsoft.com/office/drawing/2014/main" id="{E9D33F78-1996-4E75-803D-E403CAEE3DAC}"/>
+              </a:ext>
+            </a:extLst>
+          </p:cNvPr>
+          <p:cNvPicPr>
+            <a:picLocks noChangeAspect="1"/>
+          </p:cNvPicPr>
+          <p:nvPr/>
+        </p:nvPicPr>
+        <p:blipFill>
+          <a:blip r:embed="rId2"/>
+          <a:stretch>
+            <a:fillRect/>
+          </a:stretch>
+        </p:blipFill>
+        <p:spPr>
+          <a:xfrm>
+            <a:off x="611560" y="313271"/>
+            <a:ext cx="1020471" cy="1065734"/>
+          </a:xfrm>
+          <a:prstGeom prst="rect">
+            <a:avLst/>
+          </a:prstGeom>
+        </p:spPr>
+      </p:pic>
+      <p:sp>
+        <p:nvSpPr>
+          <p:cNvPr id="8" name="Inhaltsplatzhalter 2">
+            <a:extLst>
+              <a:ext uri="{FF2B5EF4-FFF2-40B4-BE49-F238E27FC236}">
+                <a16:creationId xmlns:a16="http://schemas.microsoft.com/office/drawing/2014/main" id="{FD41DC43-1A29-4CCA-8C55-47290F2A8EAF}"/>
+              </a:ext>
+            </a:extLst>
+          </p:cNvPr>
+          <p:cNvSpPr>
+            <a:spLocks noGrp="1"/>
+          </p:cNvSpPr>
+          <p:nvPr>
+            <p:ph idx="1"/>
+          </p:nvPr>
+        </p:nvSpPr>
+        <p:spPr>
+          <a:xfrm>
+            <a:off x="457200" y="1844824"/>
+            <a:ext cx="8229600" cy="720080"/>
+          </a:xfrm>
+        </p:spPr>
+        <p:txBody>
+          <a:bodyPr>
+            <a:normAutofit/>
+          </a:bodyPr>
+          <a:lstStyle/>
+          <a:p>
+            <a:pPr marL="0" indent="0" algn="ctr">
+              <a:buNone/>
+            </a:pPr>
+            <a:r>
+              <a:rPr lang="de-AT" sz="4000" u="sng" dirty="0"/>
+              <a:t>Developer-Tools</a:t>
+            </a:r>
+            <a:endParaRPr lang="de-AT" sz="4000" dirty="0"/>
+          </a:p>
+          <a:p>
+            <a:endParaRPr lang="de-AT" sz="4000" dirty="0"/>
+          </a:p>
+          <a:p>
+            <a:endParaRPr lang="de-AT" sz="4000" dirty="0"/>
+          </a:p>
+        </p:txBody>
+      </p:sp>
+      <p:pic>
+        <p:nvPicPr>
+          <p:cNvPr id="9" name="Grafik 8" descr="Bildergebnis für spring tool suite">
+            <a:extLst>
+              <a:ext uri="{FF2B5EF4-FFF2-40B4-BE49-F238E27FC236}">
+                <a16:creationId xmlns:a16="http://schemas.microsoft.com/office/drawing/2014/main" id="{150B4C4B-6919-49AC-8C47-B54AD3186DE8}"/>
+              </a:ext>
+            </a:extLst>
+          </p:cNvPr>
+          <p:cNvPicPr/>
+          <p:nvPr/>
+        </p:nvPicPr>
+        <p:blipFill>
+          <a:blip r:embed="rId3" cstate="print">
+            <a:extLst>
+              <a:ext uri="{28A0092B-C50C-407E-A947-70E740481C1C}">
+                <a14:useLocalDpi xmlns:a14="http://schemas.microsoft.com/office/drawing/2010/main" val="0"/>
+              </a:ext>
+            </a:extLst>
+          </a:blip>
+          <a:srcRect/>
+          <a:stretch>
+            <a:fillRect/>
+          </a:stretch>
+        </p:blipFill>
+        <p:spPr bwMode="auto">
+          <a:xfrm>
+            <a:off x="780530" y="3466104"/>
+            <a:ext cx="1656184" cy="1872208"/>
+          </a:xfrm>
+          <a:prstGeom prst="rect">
+            <a:avLst/>
+          </a:prstGeom>
+          <a:noFill/>
+          <a:ln>
+            <a:noFill/>
+          </a:ln>
+        </p:spPr>
+      </p:pic>
+      <p:pic>
+        <p:nvPicPr>
+          <p:cNvPr id="10" name="Grafik 9" descr="Bildergebnis für wildfly">
+            <a:extLst>
+              <a:ext uri="{FF2B5EF4-FFF2-40B4-BE49-F238E27FC236}">
+                <a16:creationId xmlns:a16="http://schemas.microsoft.com/office/drawing/2014/main" id="{671B769D-4A9C-444F-8E08-C6B2497AA03C}"/>
+              </a:ext>
+            </a:extLst>
+          </p:cNvPr>
+          <p:cNvPicPr/>
+          <p:nvPr/>
+        </p:nvPicPr>
+        <p:blipFill>
+          <a:blip r:embed="rId4" cstate="print">
+            <a:extLst>
+              <a:ext uri="{28A0092B-C50C-407E-A947-70E740481C1C}">
+                <a14:useLocalDpi xmlns:a14="http://schemas.microsoft.com/office/drawing/2010/main" val="0"/>
+              </a:ext>
+            </a:extLst>
+          </a:blip>
+          <a:srcRect/>
+          <a:stretch>
+            <a:fillRect/>
+          </a:stretch>
+        </p:blipFill>
+        <p:spPr bwMode="auto">
+          <a:xfrm>
+            <a:off x="3311859" y="2992090"/>
+            <a:ext cx="2520280" cy="747832"/>
+          </a:xfrm>
+          <a:prstGeom prst="rect">
+            <a:avLst/>
+          </a:prstGeom>
+          <a:noFill/>
+          <a:ln>
+            <a:noFill/>
+          </a:ln>
+        </p:spPr>
+      </p:pic>
+      <p:pic>
+        <p:nvPicPr>
+          <p:cNvPr id="11" name="Grafik 10" descr="Bildergebnis für mysql">
+            <a:extLst>
+              <a:ext uri="{FF2B5EF4-FFF2-40B4-BE49-F238E27FC236}">
+                <a16:creationId xmlns:a16="http://schemas.microsoft.com/office/drawing/2014/main" id="{DA731A10-5A35-48C5-A607-EB0073981931}"/>
+              </a:ext>
+            </a:extLst>
+          </p:cNvPr>
+          <p:cNvPicPr/>
+          <p:nvPr/>
+        </p:nvPicPr>
+        <p:blipFill>
+          <a:blip r:embed="rId5" cstate="print">
+            <a:extLst>
+              <a:ext uri="{28A0092B-C50C-407E-A947-70E740481C1C}">
+                <a14:useLocalDpi xmlns:a14="http://schemas.microsoft.com/office/drawing/2010/main" val="0"/>
+              </a:ext>
+            </a:extLst>
+          </a:blip>
+          <a:srcRect/>
+          <a:stretch>
+            <a:fillRect/>
+          </a:stretch>
+        </p:blipFill>
+        <p:spPr bwMode="auto">
+          <a:xfrm>
+            <a:off x="6084273" y="2564904"/>
+            <a:ext cx="2160241" cy="1472428"/>
+          </a:xfrm>
+          <a:prstGeom prst="rect">
+            <a:avLst/>
+          </a:prstGeom>
+          <a:noFill/>
+          <a:ln>
+            <a:noFill/>
+          </a:ln>
+        </p:spPr>
+      </p:pic>
+      <p:pic>
+        <p:nvPicPr>
+          <p:cNvPr id="12" name="Grafik 11" descr="Bildergebnis für angularjs">
+            <a:extLst>
+              <a:ext uri="{FF2B5EF4-FFF2-40B4-BE49-F238E27FC236}">
+                <a16:creationId xmlns:a16="http://schemas.microsoft.com/office/drawing/2014/main" id="{80A72C5F-C150-400E-BCF4-A70BF7F97A06}"/>
+              </a:ext>
+            </a:extLst>
+          </p:cNvPr>
+          <p:cNvPicPr/>
+          <p:nvPr/>
+        </p:nvPicPr>
+        <p:blipFill>
+          <a:blip r:embed="rId6">
+            <a:extLst>
+              <a:ext uri="{28A0092B-C50C-407E-A947-70E740481C1C}">
+                <a14:useLocalDpi xmlns:a14="http://schemas.microsoft.com/office/drawing/2010/main" val="0"/>
+              </a:ext>
+            </a:extLst>
+          </a:blip>
+          <a:srcRect/>
+          <a:stretch>
+            <a:fillRect/>
+          </a:stretch>
+        </p:blipFill>
+        <p:spPr bwMode="auto">
+          <a:xfrm>
+            <a:off x="3646943" y="4228946"/>
+            <a:ext cx="1850112" cy="1925068"/>
+          </a:xfrm>
+          <a:prstGeom prst="rect">
+            <a:avLst/>
+          </a:prstGeom>
+          <a:noFill/>
+          <a:ln>
+            <a:noFill/>
+          </a:ln>
+        </p:spPr>
+      </p:pic>
+      <p:pic>
+        <p:nvPicPr>
+          <p:cNvPr id="13" name="Grafik 12" descr="Bildergebnis für bootstrap">
+            <a:extLst>
+              <a:ext uri="{FF2B5EF4-FFF2-40B4-BE49-F238E27FC236}">
+                <a16:creationId xmlns:a16="http://schemas.microsoft.com/office/drawing/2014/main" id="{A66DA320-02AF-472F-B834-0E9BC1E5E8B1}"/>
+              </a:ext>
+            </a:extLst>
+          </p:cNvPr>
+          <p:cNvPicPr/>
+          <p:nvPr/>
+        </p:nvPicPr>
+        <p:blipFill>
+          <a:blip r:embed="rId7" cstate="print">
+            <a:extLst>
+              <a:ext uri="{28A0092B-C50C-407E-A947-70E740481C1C}">
+                <a14:useLocalDpi xmlns:a14="http://schemas.microsoft.com/office/drawing/2010/main" val="0"/>
+              </a:ext>
+            </a:extLst>
+          </a:blip>
+          <a:srcRect/>
+          <a:stretch>
+            <a:fillRect/>
+          </a:stretch>
+        </p:blipFill>
+        <p:spPr bwMode="auto">
+          <a:xfrm>
+            <a:off x="6588224" y="4653136"/>
+            <a:ext cx="1148216" cy="1150037"/>
+          </a:xfrm>
+          <a:prstGeom prst="rect">
+            <a:avLst/>
+          </a:prstGeom>
+          <a:noFill/>
+          <a:ln>
+            <a:noFill/>
+          </a:ln>
+        </p:spPr>
+      </p:pic>
+    </p:spTree>
+    <p:extLst>
+      <p:ext uri="{BB962C8B-B14F-4D97-AF65-F5344CB8AC3E}">
+        <p14:creationId xmlns:p14="http://schemas.microsoft.com/office/powerpoint/2010/main" val="19058577"/>
+      </p:ext>
+    </p:extLst>
+  </p:cSld>
+  <p:clrMapOvr>
+    <a:masterClrMapping/>
+  </p:clrMapOvr>
+</p:sld>
+</file>
+
+<file path=ppt/slides/slide6.xml><?xml version="1.0" encoding="utf-8"?>
+<p:sld xmlns:a="http://schemas.openxmlformats.org/drawingml/2006/main" xmlns:r="http://schemas.openxmlformats.org/officeDocument/2006/relationships" xmlns:p="http://schemas.openxmlformats.org/presentationml/2006/main">
+  <p:cSld>
+    <p:spTree>
+      <p:nvGrpSpPr>
+        <p:cNvPr id="1" name=""/>
+        <p:cNvGrpSpPr/>
+        <p:nvPr/>
+      </p:nvGrpSpPr>
+      <p:grpSpPr>
+        <a:xfrm>
+          <a:off x="0" y="0"/>
+          <a:ext cx="0" cy="0"/>
+          <a:chOff x="0" y="0"/>
+          <a:chExt cx="0" cy="0"/>
+        </a:xfrm>
+      </p:grpSpPr>
+      <p:sp>
+        <p:nvSpPr>
+          <p:cNvPr id="2" name="Titel 1">
+            <a:extLst>
+              <a:ext uri="{FF2B5EF4-FFF2-40B4-BE49-F238E27FC236}">
+                <a16:creationId xmlns:a16="http://schemas.microsoft.com/office/drawing/2014/main" id="{DACCC2B6-6A38-4119-A770-CEF2A062B6C6}"/>
+              </a:ext>
+            </a:extLst>
+          </p:cNvPr>
+          <p:cNvSpPr>
+            <a:spLocks noGrp="1"/>
+          </p:cNvSpPr>
+          <p:nvPr>
+            <p:ph type="title"/>
+          </p:nvPr>
+        </p:nvSpPr>
+        <p:spPr>
+          <a:xfrm>
+            <a:off x="457200" y="274638"/>
+            <a:ext cx="8229600" cy="1143000"/>
+          </a:xfrm>
+          <a:solidFill>
+            <a:srgbClr val="8F111A"/>
+          </a:solidFill>
+          <a:ln w="12700">
+            <a:solidFill>
+              <a:schemeClr val="tx1"/>
+            </a:solidFill>
+          </a:ln>
+        </p:spPr>
+        <p:txBody>
+          <a:bodyPr/>
+          <a:lstStyle/>
+          <a:p>
+            <a:r>
+              <a:rPr lang="de-AT" dirty="0"/>
+              <a:t>Implementierung 2</a:t>
+            </a:r>
+          </a:p>
+        </p:txBody>
+      </p:sp>
+      <p:pic>
+        <p:nvPicPr>
+          <p:cNvPr id="4" name="Grafik 3">
+            <a:extLst>
+              <a:ext uri="{FF2B5EF4-FFF2-40B4-BE49-F238E27FC236}">
+                <a16:creationId xmlns:a16="http://schemas.microsoft.com/office/drawing/2014/main" id="{E9D33F78-1996-4E75-803D-E403CAEE3DAC}"/>
+              </a:ext>
+            </a:extLst>
+          </p:cNvPr>
+          <p:cNvPicPr>
+            <a:picLocks noChangeAspect="1"/>
+          </p:cNvPicPr>
+          <p:nvPr/>
+        </p:nvPicPr>
+        <p:blipFill>
+          <a:blip r:embed="rId2"/>
+          <a:stretch>
+            <a:fillRect/>
+          </a:stretch>
+        </p:blipFill>
+        <p:spPr>
+          <a:xfrm>
+            <a:off x="611560" y="313271"/>
+            <a:ext cx="1020471" cy="1065734"/>
+          </a:xfrm>
+          <a:prstGeom prst="rect">
+            <a:avLst/>
+          </a:prstGeom>
+        </p:spPr>
+      </p:pic>
+      <p:pic>
+        <p:nvPicPr>
+          <p:cNvPr id="5" name="Grafik 4">
+            <a:extLst>
+              <a:ext uri="{FF2B5EF4-FFF2-40B4-BE49-F238E27FC236}">
+                <a16:creationId xmlns:a16="http://schemas.microsoft.com/office/drawing/2014/main" id="{CF1A4ACB-13BF-45E2-8607-01099D5436B0}"/>
+              </a:ext>
+            </a:extLst>
+          </p:cNvPr>
+          <p:cNvPicPr>
+            <a:picLocks noChangeAspect="1"/>
+          </p:cNvPicPr>
+          <p:nvPr/>
+        </p:nvPicPr>
+        <p:blipFill>
+          <a:blip r:embed="rId3"/>
+          <a:stretch>
+            <a:fillRect/>
+          </a:stretch>
+        </p:blipFill>
+        <p:spPr>
+          <a:xfrm>
+            <a:off x="1160032" y="1772816"/>
+            <a:ext cx="6823936" cy="4680520"/>
+          </a:xfrm>
+          <a:prstGeom prst="rect">
+            <a:avLst/>
+          </a:prstGeom>
+        </p:spPr>
+      </p:pic>
+    </p:spTree>
+    <p:extLst>
+      <p:ext uri="{BB962C8B-B14F-4D97-AF65-F5344CB8AC3E}">
+        <p14:creationId xmlns:p14="http://schemas.microsoft.com/office/powerpoint/2010/main" val="2129019359"/>
+      </p:ext>
+    </p:extLst>
+  </p:cSld>
+  <p:clrMapOvr>
+    <a:masterClrMapping/>
+  </p:clrMapOvr>
+</p:sld>
+</file>
+
+<file path=ppt/slides/slide7.xml><?xml version="1.0" encoding="utf-8"?>
+<p:sld xmlns:a="http://schemas.openxmlformats.org/drawingml/2006/main" xmlns:r="http://schemas.openxmlformats.org/officeDocument/2006/relationships" xmlns:p="http://schemas.openxmlformats.org/presentationml/2006/main">
+  <p:cSld>
+    <p:spTree>
+      <p:nvGrpSpPr>
+        <p:cNvPr id="1" name=""/>
+        <p:cNvGrpSpPr/>
+        <p:nvPr/>
+      </p:nvGrpSpPr>
+      <p:grpSpPr>
+        <a:xfrm>
+          <a:off x="0" y="0"/>
+          <a:ext cx="0" cy="0"/>
+          <a:chOff x="0" y="0"/>
+          <a:chExt cx="0" cy="0"/>
+        </a:xfrm>
+      </p:grpSpPr>
+      <p:sp>
+        <p:nvSpPr>
+          <p:cNvPr id="2" name="Titel 1">
+            <a:extLst>
+              <a:ext uri="{FF2B5EF4-FFF2-40B4-BE49-F238E27FC236}">
+                <a16:creationId xmlns:a16="http://schemas.microsoft.com/office/drawing/2014/main" id="{DACCC2B6-6A38-4119-A770-CEF2A062B6C6}"/>
+              </a:ext>
+            </a:extLst>
+          </p:cNvPr>
+          <p:cNvSpPr>
+            <a:spLocks noGrp="1"/>
+          </p:cNvSpPr>
+          <p:nvPr>
+            <p:ph type="title"/>
+          </p:nvPr>
+        </p:nvSpPr>
+        <p:spPr>
+          <a:xfrm>
+            <a:off x="457200" y="274638"/>
+            <a:ext cx="8229600" cy="1143000"/>
+          </a:xfrm>
+          <a:solidFill>
+            <a:srgbClr val="8F111A"/>
+          </a:solidFill>
+          <a:ln w="12700">
+            <a:solidFill>
+              <a:schemeClr val="tx1"/>
+            </a:solidFill>
+          </a:ln>
+        </p:spPr>
+        <p:txBody>
+          <a:bodyPr/>
+          <a:lstStyle/>
+          <a:p>
+            <a:r>
+              <a:rPr lang="de-AT" dirty="0"/>
+              <a:t>Implementierung 3</a:t>
+            </a:r>
+          </a:p>
+        </p:txBody>
+      </p:sp>
+      <p:pic>
+        <p:nvPicPr>
+          <p:cNvPr id="4" name="Grafik 3">
+            <a:extLst>
+              <a:ext uri="{FF2B5EF4-FFF2-40B4-BE49-F238E27FC236}">
+                <a16:creationId xmlns:a16="http://schemas.microsoft.com/office/drawing/2014/main" id="{E9D33F78-1996-4E75-803D-E403CAEE3DAC}"/>
+              </a:ext>
+            </a:extLst>
+          </p:cNvPr>
+          <p:cNvPicPr>
+            <a:picLocks noChangeAspect="1"/>
+          </p:cNvPicPr>
+          <p:nvPr/>
+        </p:nvPicPr>
+        <p:blipFill>
+          <a:blip r:embed="rId2"/>
+          <a:stretch>
+            <a:fillRect/>
+          </a:stretch>
+        </p:blipFill>
+        <p:spPr>
+          <a:xfrm>
+            <a:off x="611560" y="313271"/>
+            <a:ext cx="1020471" cy="1065734"/>
+          </a:xfrm>
+          <a:prstGeom prst="rect">
+            <a:avLst/>
+          </a:prstGeom>
+        </p:spPr>
+      </p:pic>
+      <p:sp>
+        <p:nvSpPr>
+          <p:cNvPr id="6" name="Inhaltsplatzhalter 2">
+            <a:extLst>
+              <a:ext uri="{FF2B5EF4-FFF2-40B4-BE49-F238E27FC236}">
+                <a16:creationId xmlns:a16="http://schemas.microsoft.com/office/drawing/2014/main" id="{8F150A8E-6E58-403F-9E50-7E315F8A5B6A}"/>
+              </a:ext>
+            </a:extLst>
+          </p:cNvPr>
+          <p:cNvSpPr>
+            <a:spLocks noGrp="1"/>
+          </p:cNvSpPr>
+          <p:nvPr>
+            <p:ph idx="1"/>
+          </p:nvPr>
+        </p:nvSpPr>
+        <p:spPr>
+          <a:xfrm>
+            <a:off x="457200" y="1700808"/>
+            <a:ext cx="8229600" cy="4752528"/>
+          </a:xfrm>
+        </p:spPr>
+        <p:txBody>
+          <a:bodyPr>
+            <a:normAutofit lnSpcReduction="10000"/>
+          </a:bodyPr>
+          <a:lstStyle/>
+          <a:p>
+            <a:pPr marL="0" indent="0">
+              <a:buNone/>
+            </a:pPr>
+            <a:r>
+              <a:rPr lang="de-AT" sz="4000" u="sng" dirty="0"/>
+              <a:t>„Lokales“ Backend</a:t>
+            </a:r>
+            <a:endParaRPr lang="de-AT" sz="4000" dirty="0"/>
+          </a:p>
+          <a:p>
+            <a:pPr marL="0" indent="0">
+              <a:buNone/>
+            </a:pPr>
+            <a:endParaRPr lang="de-AT" sz="4000" dirty="0"/>
+          </a:p>
+          <a:p>
+            <a:pPr marL="0" indent="0">
+              <a:buNone/>
+            </a:pPr>
+            <a:r>
+              <a:rPr lang="de-AT" sz="4000" dirty="0"/>
+              <a:t>MySQL</a:t>
+            </a:r>
+          </a:p>
+          <a:p>
+            <a:pPr lvl="2"/>
+            <a:r>
+              <a:rPr lang="de-DE" dirty="0"/>
+              <a:t>Bereitstellen und Betreiben der Datenbank</a:t>
+            </a:r>
+            <a:endParaRPr lang="de-DE" sz="4000" dirty="0"/>
+          </a:p>
+          <a:p>
+            <a:pPr marL="0" indent="0">
+              <a:buNone/>
+            </a:pPr>
+            <a:r>
+              <a:rPr lang="de-DE" sz="4000" dirty="0" err="1"/>
+              <a:t>WildFly</a:t>
+            </a:r>
+            <a:endParaRPr lang="de-DE" sz="2400" dirty="0"/>
+          </a:p>
+          <a:p>
+            <a:pPr lvl="2"/>
+            <a:r>
+              <a:rPr lang="de-DE" dirty="0"/>
+              <a:t>Bereitstellen der http-Schnittstelle</a:t>
+            </a:r>
+            <a:endParaRPr lang="de-AT" sz="4000" dirty="0"/>
+          </a:p>
+          <a:p>
+            <a:pPr marL="0" indent="0">
+              <a:buNone/>
+            </a:pPr>
+            <a:r>
+              <a:rPr lang="de-DE" sz="4000" dirty="0"/>
+              <a:t>Spring Tool Suite (STS)</a:t>
+            </a:r>
+            <a:endParaRPr lang="de-AT" sz="4000" dirty="0"/>
+          </a:p>
+          <a:p>
+            <a:pPr lvl="2"/>
+            <a:r>
+              <a:rPr lang="de-DE" dirty="0"/>
+              <a:t>Backendprogramm (Verwendet </a:t>
+            </a:r>
+            <a:r>
+              <a:rPr lang="de-DE" dirty="0" err="1"/>
+              <a:t>WildFly</a:t>
+            </a:r>
+            <a:r>
+              <a:rPr lang="de-DE" dirty="0"/>
+              <a:t>/MySQL)</a:t>
+            </a:r>
+          </a:p>
+          <a:p>
+            <a:endParaRPr lang="de-AT" sz="4000" dirty="0"/>
+          </a:p>
+        </p:txBody>
+      </p:sp>
+    </p:spTree>
+    <p:extLst>
+      <p:ext uri="{BB962C8B-B14F-4D97-AF65-F5344CB8AC3E}">
+        <p14:creationId xmlns:p14="http://schemas.microsoft.com/office/powerpoint/2010/main" val="3777114599"/>
+      </p:ext>
+    </p:extLst>
+  </p:cSld>
+  <p:clrMapOvr>
+    <a:masterClrMapping/>
+  </p:clrMapOvr>
+</p:sld>
+</file>
+
+<file path=ppt/slides/slide8.xml><?xml version="1.0" encoding="utf-8"?>
+<p:sld xmlns:a="http://schemas.openxmlformats.org/drawingml/2006/main" xmlns:r="http://schemas.openxmlformats.org/officeDocument/2006/relationships" xmlns:p="http://schemas.openxmlformats.org/presentationml/2006/main">
+  <p:cSld>
+    <p:spTree>
+      <p:nvGrpSpPr>
+        <p:cNvPr id="1" name=""/>
+        <p:cNvGrpSpPr/>
+        <p:nvPr/>
+      </p:nvGrpSpPr>
+      <p:grpSpPr>
+        <a:xfrm>
+          <a:off x="0" y="0"/>
+          <a:ext cx="0" cy="0"/>
+          <a:chOff x="0" y="0"/>
+          <a:chExt cx="0" cy="0"/>
+        </a:xfrm>
+      </p:grpSpPr>
+      <p:sp>
+        <p:nvSpPr>
+          <p:cNvPr id="2" name="Titel 1">
+            <a:extLst>
+              <a:ext uri="{FF2B5EF4-FFF2-40B4-BE49-F238E27FC236}">
+                <a16:creationId xmlns:a16="http://schemas.microsoft.com/office/drawing/2014/main" id="{DACCC2B6-6A38-4119-A770-CEF2A062B6C6}"/>
+              </a:ext>
+            </a:extLst>
+          </p:cNvPr>
+          <p:cNvSpPr>
+            <a:spLocks noGrp="1"/>
+          </p:cNvSpPr>
+          <p:nvPr>
+            <p:ph type="title"/>
+          </p:nvPr>
+        </p:nvSpPr>
+        <p:spPr>
+          <a:xfrm>
+            <a:off x="457200" y="274638"/>
+            <a:ext cx="8229600" cy="1143000"/>
+          </a:xfrm>
+          <a:solidFill>
+            <a:srgbClr val="8F111A"/>
+          </a:solidFill>
+          <a:ln w="12700">
+            <a:solidFill>
+              <a:schemeClr val="tx1"/>
+            </a:solidFill>
+          </a:ln>
+        </p:spPr>
+        <p:txBody>
+          <a:bodyPr/>
+          <a:lstStyle/>
+          <a:p>
+            <a:r>
+              <a:rPr lang="de-AT" dirty="0"/>
+              <a:t>Implementierung 4</a:t>
+            </a:r>
+          </a:p>
+        </p:txBody>
+      </p:sp>
+      <p:pic>
+        <p:nvPicPr>
+          <p:cNvPr id="4" name="Grafik 3">
+            <a:extLst>
+              <a:ext uri="{FF2B5EF4-FFF2-40B4-BE49-F238E27FC236}">
+                <a16:creationId xmlns:a16="http://schemas.microsoft.com/office/drawing/2014/main" id="{E9D33F78-1996-4E75-803D-E403CAEE3DAC}"/>
+              </a:ext>
+            </a:extLst>
+          </p:cNvPr>
+          <p:cNvPicPr>
+            <a:picLocks noChangeAspect="1"/>
+          </p:cNvPicPr>
+          <p:nvPr/>
+        </p:nvPicPr>
+        <p:blipFill>
+          <a:blip r:embed="rId2"/>
+          <a:stretch>
+            <a:fillRect/>
+          </a:stretch>
+        </p:blipFill>
+        <p:spPr>
+          <a:xfrm>
+            <a:off x="611560" y="313271"/>
+            <a:ext cx="1020471" cy="1065734"/>
+          </a:xfrm>
+          <a:prstGeom prst="rect">
+            <a:avLst/>
+          </a:prstGeom>
+        </p:spPr>
+      </p:pic>
+      <p:sp>
+        <p:nvSpPr>
+          <p:cNvPr id="6" name="Inhaltsplatzhalter 2">
+            <a:extLst>
+              <a:ext uri="{FF2B5EF4-FFF2-40B4-BE49-F238E27FC236}">
+                <a16:creationId xmlns:a16="http://schemas.microsoft.com/office/drawing/2014/main" id="{8F150A8E-6E58-403F-9E50-7E315F8A5B6A}"/>
+              </a:ext>
+            </a:extLst>
+          </p:cNvPr>
+          <p:cNvSpPr>
+            <a:spLocks noGrp="1"/>
+          </p:cNvSpPr>
+          <p:nvPr>
+            <p:ph idx="1"/>
+          </p:nvPr>
+        </p:nvSpPr>
+        <p:spPr>
+          <a:xfrm>
+            <a:off x="457200" y="1844824"/>
+            <a:ext cx="8229600" cy="4608512"/>
+          </a:xfrm>
+        </p:spPr>
+        <p:txBody>
+          <a:bodyPr>
+            <a:normAutofit lnSpcReduction="10000"/>
+          </a:bodyPr>
+          <a:lstStyle/>
+          <a:p>
+            <a:pPr marL="0" indent="0">
+              <a:buNone/>
+            </a:pPr>
+            <a:r>
+              <a:rPr lang="de-DE" sz="4000" u="sng" dirty="0"/>
+              <a:t>Frontend</a:t>
+            </a:r>
+            <a:endParaRPr lang="de-AT" sz="4000" dirty="0"/>
+          </a:p>
+          <a:p>
+            <a:pPr marL="0" indent="0">
+              <a:buNone/>
+            </a:pPr>
+            <a:endParaRPr lang="de-AT" sz="4000" dirty="0"/>
+          </a:p>
+          <a:p>
+            <a:pPr marL="0" indent="0">
+              <a:buNone/>
+            </a:pPr>
+            <a:r>
+              <a:rPr lang="de-AT" sz="4000" dirty="0" err="1"/>
+              <a:t>AngularJS</a:t>
+            </a:r>
+            <a:endParaRPr lang="de-AT" sz="4000" dirty="0"/>
+          </a:p>
+          <a:p>
+            <a:pPr lvl="2"/>
+            <a:r>
+              <a:rPr lang="de-DE" dirty="0"/>
+              <a:t>JavaScript-Framework / Single-Page-Webanwendung</a:t>
+            </a:r>
+            <a:endParaRPr lang="de-DE" sz="4000" dirty="0"/>
+          </a:p>
+          <a:p>
+            <a:pPr marL="0" indent="0">
+              <a:buNone/>
+            </a:pPr>
+            <a:r>
+              <a:rPr lang="de-DE" sz="4000" dirty="0"/>
+              <a:t>Bootstrap</a:t>
+            </a:r>
+            <a:endParaRPr lang="de-DE" sz="2400" dirty="0"/>
+          </a:p>
+          <a:p>
+            <a:pPr lvl="2"/>
+            <a:r>
+              <a:rPr lang="de-DE" dirty="0"/>
+              <a:t>CSS-Framework für die Frontend-Anwendung </a:t>
+            </a:r>
+          </a:p>
+          <a:p>
+            <a:pPr marL="0" indent="0">
+              <a:buNone/>
+            </a:pPr>
+            <a:r>
+              <a:rPr lang="de-DE" sz="4000" dirty="0"/>
+              <a:t>Browser</a:t>
+            </a:r>
+            <a:endParaRPr lang="de-DE" sz="2400" dirty="0"/>
+          </a:p>
+          <a:p>
+            <a:pPr lvl="2"/>
+            <a:r>
+              <a:rPr lang="de-DE" dirty="0"/>
+              <a:t>Unterstützung von </a:t>
+            </a:r>
+            <a:r>
+              <a:rPr lang="de-DE" dirty="0" err="1"/>
+              <a:t>AngularJS</a:t>
+            </a:r>
+            <a:r>
+              <a:rPr lang="de-DE" dirty="0"/>
+              <a:t> notwendig</a:t>
+            </a:r>
+            <a:endParaRPr lang="de-AT" sz="4000" dirty="0"/>
+          </a:p>
+        </p:txBody>
+      </p:sp>
+    </p:spTree>
+    <p:extLst>
+      <p:ext uri="{BB962C8B-B14F-4D97-AF65-F5344CB8AC3E}">
+        <p14:creationId xmlns:p14="http://schemas.microsoft.com/office/powerpoint/2010/main" val="629996483"/>
+      </p:ext>
+    </p:extLst>
+  </p:cSld>
+  <p:clrMapOvr>
+    <a:masterClrMapping/>
+  </p:clrMapOvr>
+</p:sld>
+</file>
+
+<file path=ppt/slides/slide9.xml><?xml version="1.0" encoding="utf-8"?>
+<p:sld xmlns:a="http://schemas.openxmlformats.org/drawingml/2006/main" xmlns:r="http://schemas.openxmlformats.org/officeDocument/2006/relationships" xmlns:p="http://schemas.openxmlformats.org/presentationml/2006/main">
+  <p:cSld>
+    <p:spTree>
+      <p:nvGrpSpPr>
+        <p:cNvPr id="1" name=""/>
+        <p:cNvGrpSpPr/>
+        <p:nvPr/>
+      </p:nvGrpSpPr>
+      <p:grpSpPr>
+        <a:xfrm>
+          <a:off x="0" y="0"/>
+          <a:ext cx="0" cy="0"/>
+          <a:chOff x="0" y="0"/>
+          <a:chExt cx="0" cy="0"/>
+        </a:xfrm>
+      </p:grpSpPr>
+      <p:sp>
+        <p:nvSpPr>
+          <p:cNvPr id="2" name="Titel 1">
+            <a:extLst>
+              <a:ext uri="{FF2B5EF4-FFF2-40B4-BE49-F238E27FC236}">
+                <a16:creationId xmlns:a16="http://schemas.microsoft.com/office/drawing/2014/main" id="{DACCC2B6-6A38-4119-A770-CEF2A062B6C6}"/>
+              </a:ext>
+            </a:extLst>
+          </p:cNvPr>
+          <p:cNvSpPr>
+            <a:spLocks noGrp="1"/>
+          </p:cNvSpPr>
+          <p:nvPr>
+            <p:ph type="title"/>
+          </p:nvPr>
+        </p:nvSpPr>
+        <p:spPr>
+          <a:xfrm>
+            <a:off x="457200" y="274638"/>
+            <a:ext cx="8229600" cy="1143000"/>
+          </a:xfrm>
+          <a:solidFill>
+            <a:srgbClr val="8F111A"/>
+          </a:solidFill>
+          <a:ln w="12700">
+            <a:solidFill>
+              <a:schemeClr val="tx1"/>
+            </a:solidFill>
+          </a:ln>
+        </p:spPr>
+        <p:txBody>
+          <a:bodyPr/>
+          <a:lstStyle/>
+          <a:p>
+            <a:r>
+              <a:rPr lang="de-AT" dirty="0"/>
+              <a:t>Funktionalität 1</a:t>
+            </a:r>
+          </a:p>
+        </p:txBody>
+      </p:sp>
+      <p:pic>
+        <p:nvPicPr>
+          <p:cNvPr id="4" name="Grafik 3">
+            <a:extLst>
+              <a:ext uri="{FF2B5EF4-FFF2-40B4-BE49-F238E27FC236}">
+                <a16:creationId xmlns:a16="http://schemas.microsoft.com/office/drawing/2014/main" id="{E9D33F78-1996-4E75-803D-E403CAEE3DAC}"/>
+              </a:ext>
+            </a:extLst>
+          </p:cNvPr>
+          <p:cNvPicPr>
+            <a:picLocks noChangeAspect="1"/>
+          </p:cNvPicPr>
+          <p:nvPr/>
+        </p:nvPicPr>
+        <p:blipFill>
+          <a:blip r:embed="rId2"/>
+          <a:stretch>
+            <a:fillRect/>
+          </a:stretch>
+        </p:blipFill>
+        <p:spPr>
+          <a:xfrm>
+            <a:off x="611560" y="313271"/>
+            <a:ext cx="1020471" cy="1065734"/>
+          </a:xfrm>
+          <a:prstGeom prst="rect">
+            <a:avLst/>
+          </a:prstGeom>
+        </p:spPr>
+      </p:pic>
+      <p:sp>
+        <p:nvSpPr>
+          <p:cNvPr id="6" name="Inhaltsplatzhalter 2">
+            <a:extLst>
+              <a:ext uri="{FF2B5EF4-FFF2-40B4-BE49-F238E27FC236}">
+                <a16:creationId xmlns:a16="http://schemas.microsoft.com/office/drawing/2014/main" id="{8F150A8E-6E58-403F-9E50-7E315F8A5B6A}"/>
+              </a:ext>
+            </a:extLst>
+          </p:cNvPr>
+          <p:cNvSpPr>
+            <a:spLocks noGrp="1"/>
+          </p:cNvSpPr>
+          <p:nvPr>
+            <p:ph idx="1"/>
+          </p:nvPr>
+        </p:nvSpPr>
+        <p:spPr>
+          <a:xfrm>
+            <a:off x="457200" y="1844824"/>
+            <a:ext cx="8229600" cy="4608512"/>
+          </a:xfrm>
+        </p:spPr>
+        <p:txBody>
+          <a:bodyPr>
+            <a:normAutofit fontScale="92500" lnSpcReduction="20000"/>
+          </a:bodyPr>
+          <a:lstStyle/>
+          <a:p>
+            <a:pPr marL="0" indent="0">
+              <a:buNone/>
+            </a:pPr>
+            <a:r>
+              <a:rPr lang="de-AT" sz="4000" u="sng" dirty="0"/>
+              <a:t>Voraussetzungen </a:t>
+            </a:r>
+          </a:p>
+          <a:p>
+            <a:pPr lvl="1"/>
+            <a:r>
+              <a:rPr lang="de-AT" sz="3600" dirty="0"/>
+              <a:t>MySQL</a:t>
+            </a:r>
+          </a:p>
+          <a:p>
+            <a:pPr lvl="1"/>
+            <a:r>
+              <a:rPr lang="de-AT" sz="3600" dirty="0" err="1"/>
+              <a:t>WildFly</a:t>
+            </a:r>
+            <a:endParaRPr lang="de-AT" sz="3600" dirty="0"/>
+          </a:p>
+          <a:p>
+            <a:pPr lvl="1"/>
+            <a:r>
+              <a:rPr lang="de-AT" sz="3600" dirty="0"/>
+              <a:t>Programmcode</a:t>
+            </a:r>
+          </a:p>
+          <a:p>
+            <a:pPr marL="457200" lvl="1" indent="0">
+              <a:buNone/>
+            </a:pPr>
+            <a:r>
+              <a:rPr lang="de-AT" sz="3600" dirty="0"/>
+              <a:t>(Derzeit umfangreiche Installation)</a:t>
+            </a:r>
+          </a:p>
+          <a:p>
+            <a:pPr marL="0" indent="0">
+              <a:buNone/>
+            </a:pPr>
+            <a:endParaRPr lang="de-AT" sz="4000" dirty="0"/>
+          </a:p>
+          <a:p>
+            <a:pPr marL="0" indent="0">
+              <a:buNone/>
+            </a:pPr>
+            <a:r>
+              <a:rPr lang="de-AT" sz="4000" u="sng" dirty="0"/>
+              <a:t>Ausführen im Browser unter: </a:t>
+            </a:r>
+          </a:p>
+          <a:p>
+            <a:pPr marL="0" indent="0">
+              <a:buNone/>
+            </a:pPr>
+            <a:r>
+              <a:rPr lang="de-AT" sz="4000" dirty="0"/>
+              <a:t>http://192.168.137.1:8080/archivist</a:t>
+            </a:r>
+          </a:p>
+        </p:txBody>
+      </p:sp>
+    </p:spTree>
+    <p:extLst>
+      <p:ext uri="{BB962C8B-B14F-4D97-AF65-F5344CB8AC3E}">
+        <p14:creationId xmlns:p14="http://schemas.microsoft.com/office/powerpoint/2010/main" val="4247052865"/>
+      </p:ext>
+    </p:extLst>
+  </p:cSld>
+  <p:clrMapOvr>
+    <a:masterClrMapping/>
+  </p:clrMapOvr>
+</p:sld>
+</file>
+
 <file path=ppt/theme/theme1.xml><?xml version="1.0" encoding="utf-8"?>
 <a:theme xmlns:a="http://schemas.openxmlformats.org/drawingml/2006/main" name="Larissa-Design">
   <a:themeElements>
     <a:clrScheme name="Larissa">
       <a:dk1>
-        <a:sysClr val="windowText"/>
+        <a:sysClr val="windowText" lastClr="000000"/>
       </a:dk1>
       <a:lt1>
-        <a:sysClr val="window"/>
+        <a:sysClr val="window" lastClr="FFFFFF"/>
       </a:lt1>
       <a:dk2>
         <a:srgbClr val="1F497D"/>

</xml_diff>